<commit_message>
Bug fix! + Presentation
</commit_message>
<xml_diff>
--- a/Birthday_Buddy_Presentation.pptx
+++ b/Birthday_Buddy_Presentation.pptx
@@ -9,6 +9,8 @@
     <p:sldId id="258" r:id="rId3"/>
     <p:sldId id="259" r:id="rId4"/>
     <p:sldId id="260" r:id="rId5"/>
+    <p:sldId id="261" r:id="rId6"/>
+    <p:sldId id="262" r:id="rId7"/>
   </p:sldIdLst>
   <p:sldSz cx="9144000" cy="6858000" type="screen4x3"/>
   <p:notesSz cx="6858000" cy="9144000"/>
@@ -5903,7 +5905,7 @@
             </a:pPr>
             <a:r>
               <a:rPr lang="en-US" sz="1700" dirty="0"/>
-              <a:t>The Problem: Forgotten Birthdays</a:t>
+              <a:t>The Problem</a:t>
             </a:r>
           </a:p>
           <a:p>
@@ -6023,6 +6025,66 @@
           </a:p>
         </p:txBody>
       </p:sp>
+      <p:pic>
+        <p:nvPicPr>
+          <p:cNvPr id="30" name="Picture 29" descr="logo.png">
+            <a:extLst>
+              <a:ext uri="{FF2B5EF4-FFF2-40B4-BE49-F238E27FC236}">
+                <a16:creationId xmlns:a16="http://schemas.microsoft.com/office/drawing/2014/main" id="{E2FC0EF9-F764-7004-1F2C-AAA966F0BC89}"/>
+              </a:ext>
+            </a:extLst>
+          </p:cNvPr>
+          <p:cNvPicPr>
+            <a:picLocks noChangeAspect="1"/>
+          </p:cNvPicPr>
+          <p:nvPr/>
+        </p:nvPicPr>
+        <p:blipFill>
+          <a:blip r:embed="rId3"/>
+          <a:stretch>
+            <a:fillRect/>
+          </a:stretch>
+        </p:blipFill>
+        <p:spPr>
+          <a:xfrm>
+            <a:off x="83416" y="72390"/>
+            <a:ext cx="640080" cy="640080"/>
+          </a:xfrm>
+          <a:prstGeom prst="rect">
+            <a:avLst/>
+          </a:prstGeom>
+        </p:spPr>
+      </p:pic>
+      <p:pic>
+        <p:nvPicPr>
+          <p:cNvPr id="31" name="Picture 30" descr="logo.png">
+            <a:extLst>
+              <a:ext uri="{FF2B5EF4-FFF2-40B4-BE49-F238E27FC236}">
+                <a16:creationId xmlns:a16="http://schemas.microsoft.com/office/drawing/2014/main" id="{85BF4DE5-0D9B-EF16-3974-27C2D09B10D6}"/>
+              </a:ext>
+            </a:extLst>
+          </p:cNvPr>
+          <p:cNvPicPr>
+            <a:picLocks noChangeAspect="1"/>
+          </p:cNvPicPr>
+          <p:nvPr/>
+        </p:nvPicPr>
+        <p:blipFill>
+          <a:blip r:embed="rId3"/>
+          <a:stretch>
+            <a:fillRect/>
+          </a:stretch>
+        </p:blipFill>
+        <p:spPr>
+          <a:xfrm>
+            <a:off x="8449079" y="72390"/>
+            <a:ext cx="640080" cy="640080"/>
+          </a:xfrm>
+          <a:prstGeom prst="rect">
+            <a:avLst/>
+          </a:prstGeom>
+        </p:spPr>
+      </p:pic>
     </p:spTree>
   </p:cSld>
   <p:clrMapOvr>
@@ -6929,6 +6991,66 @@
           </p:txBody>
         </p:sp>
       </p:grpSp>
+      <p:pic>
+        <p:nvPicPr>
+          <p:cNvPr id="25" name="Picture 24" descr="logo.png">
+            <a:extLst>
+              <a:ext uri="{FF2B5EF4-FFF2-40B4-BE49-F238E27FC236}">
+                <a16:creationId xmlns:a16="http://schemas.microsoft.com/office/drawing/2014/main" id="{EB9E257B-2475-2295-B274-33F3CB468CEF}"/>
+              </a:ext>
+            </a:extLst>
+          </p:cNvPr>
+          <p:cNvPicPr>
+            <a:picLocks noChangeAspect="1"/>
+          </p:cNvPicPr>
+          <p:nvPr/>
+        </p:nvPicPr>
+        <p:blipFill>
+          <a:blip r:embed="rId3"/>
+          <a:stretch>
+            <a:fillRect/>
+          </a:stretch>
+        </p:blipFill>
+        <p:spPr>
+          <a:xfrm>
+            <a:off x="83416" y="72390"/>
+            <a:ext cx="640080" cy="640080"/>
+          </a:xfrm>
+          <a:prstGeom prst="rect">
+            <a:avLst/>
+          </a:prstGeom>
+        </p:spPr>
+      </p:pic>
+      <p:pic>
+        <p:nvPicPr>
+          <p:cNvPr id="26" name="Picture 25" descr="logo.png">
+            <a:extLst>
+              <a:ext uri="{FF2B5EF4-FFF2-40B4-BE49-F238E27FC236}">
+                <a16:creationId xmlns:a16="http://schemas.microsoft.com/office/drawing/2014/main" id="{E999CD0C-6B57-A6D2-0F9A-F7CFE8EDEDB8}"/>
+              </a:ext>
+            </a:extLst>
+          </p:cNvPr>
+          <p:cNvPicPr>
+            <a:picLocks noChangeAspect="1"/>
+          </p:cNvPicPr>
+          <p:nvPr/>
+        </p:nvPicPr>
+        <p:blipFill>
+          <a:blip r:embed="rId3"/>
+          <a:stretch>
+            <a:fillRect/>
+          </a:stretch>
+        </p:blipFill>
+        <p:spPr>
+          <a:xfrm>
+            <a:off x="8425777" y="72390"/>
+            <a:ext cx="640080" cy="640080"/>
+          </a:xfrm>
+          <a:prstGeom prst="rect">
+            <a:avLst/>
+          </a:prstGeom>
+        </p:spPr>
+      </p:pic>
     </p:spTree>
   </p:cSld>
   <p:clrMapOvr>
@@ -6972,7 +7094,7 @@
           <a:lstStyle/>
           <a:p>
             <a:r>
-              <a:rPr lang="en-US" sz="3200" b="1" dirty="0">
+              <a:rPr lang="en-US" sz="2800" b="1" dirty="0">
                 <a:solidFill>
                   <a:srgbClr val="007BD0"/>
                 </a:solidFill>
@@ -6980,13 +7102,26 @@
               <a:t>The</a:t>
             </a:r>
             <a:r>
-              <a:rPr sz="3200" b="1" dirty="0">
+              <a:rPr sz="2800" b="1" dirty="0">
                 <a:solidFill>
                   <a:srgbClr val="007BD0"/>
                 </a:solidFill>
               </a:rPr>
               <a:t> Brilliant, Seamless Solution</a:t>
             </a:r>
+            <a:r>
+              <a:rPr lang="en-US" sz="2800" b="1" dirty="0">
+                <a:solidFill>
+                  <a:srgbClr val="007BD0"/>
+                </a:solidFill>
+              </a:rPr>
+              <a:t> – Birthday Buddy!</a:t>
+            </a:r>
+            <a:endParaRPr sz="2800" b="1" dirty="0">
+              <a:solidFill>
+                <a:srgbClr val="007BD0"/>
+              </a:solidFill>
+            </a:endParaRPr>
           </a:p>
         </p:txBody>
       </p:sp>
@@ -7034,7 +7169,7 @@
         </p:nvSpPr>
         <p:spPr>
           <a:xfrm>
-            <a:off x="1188720" y="2175512"/>
+            <a:off x="1188720" y="2101219"/>
             <a:ext cx="7315200" cy="548640"/>
           </a:xfrm>
           <a:prstGeom prst="rect">
@@ -7070,7 +7205,7 @@
         </p:nvSpPr>
         <p:spPr>
           <a:xfrm>
-            <a:off x="1188720" y="2806190"/>
+            <a:off x="1188720" y="2781772"/>
             <a:ext cx="7315200" cy="548640"/>
           </a:xfrm>
           <a:prstGeom prst="rect">
@@ -7106,7 +7241,7 @@
         </p:nvSpPr>
         <p:spPr>
           <a:xfrm>
-            <a:off x="1188720" y="3445359"/>
+            <a:off x="1188720" y="3462325"/>
             <a:ext cx="7315200" cy="548640"/>
           </a:xfrm>
           <a:prstGeom prst="rect">
@@ -9299,7 +9434,7 @@
         </p:blipFill>
         <p:spPr>
           <a:xfrm>
-            <a:off x="551580" y="2175512"/>
+            <a:off x="551580" y="2082653"/>
             <a:ext cx="548640" cy="548640"/>
           </a:xfrm>
           <a:prstGeom prst="rect">
@@ -9335,7 +9470,7 @@
         </p:blipFill>
         <p:spPr>
           <a:xfrm>
-            <a:off x="551580" y="2806190"/>
+            <a:off x="551580" y="2744640"/>
             <a:ext cx="548640" cy="548640"/>
           </a:xfrm>
           <a:prstGeom prst="rect">
@@ -9371,7 +9506,7 @@
         </p:blipFill>
         <p:spPr>
           <a:xfrm rot="20981790">
-            <a:off x="543566" y="3445359"/>
+            <a:off x="543566" y="3406627"/>
             <a:ext cx="548640" cy="548640"/>
           </a:xfrm>
           <a:prstGeom prst="rect">
@@ -9565,7 +9700,2580 @@
           </a:p>
         </p:txBody>
       </p:sp>
+      <p:pic>
+        <p:nvPicPr>
+          <p:cNvPr id="80" name="Picture 79" descr="logo.png">
+            <a:extLst>
+              <a:ext uri="{FF2B5EF4-FFF2-40B4-BE49-F238E27FC236}">
+                <a16:creationId xmlns:a16="http://schemas.microsoft.com/office/drawing/2014/main" id="{13494CA0-C506-9412-6D69-6659B06DDF3C}"/>
+              </a:ext>
+            </a:extLst>
+          </p:cNvPr>
+          <p:cNvPicPr>
+            <a:picLocks noChangeAspect="1"/>
+          </p:cNvPicPr>
+          <p:nvPr/>
+        </p:nvPicPr>
+        <p:blipFill>
+          <a:blip r:embed="rId12"/>
+          <a:stretch>
+            <a:fillRect/>
+          </a:stretch>
+        </p:blipFill>
+        <p:spPr>
+          <a:xfrm>
+            <a:off x="83416" y="72390"/>
+            <a:ext cx="640080" cy="640080"/>
+          </a:xfrm>
+          <a:prstGeom prst="rect">
+            <a:avLst/>
+          </a:prstGeom>
+        </p:spPr>
+      </p:pic>
+      <p:pic>
+        <p:nvPicPr>
+          <p:cNvPr id="81" name="Picture 80" descr="logo.png">
+            <a:extLst>
+              <a:ext uri="{FF2B5EF4-FFF2-40B4-BE49-F238E27FC236}">
+                <a16:creationId xmlns:a16="http://schemas.microsoft.com/office/drawing/2014/main" id="{F2541719-5EFD-E155-4061-409F813F1410}"/>
+              </a:ext>
+            </a:extLst>
+          </p:cNvPr>
+          <p:cNvPicPr>
+            <a:picLocks noChangeAspect="1"/>
+          </p:cNvPicPr>
+          <p:nvPr/>
+        </p:nvPicPr>
+        <p:blipFill>
+          <a:blip r:embed="rId12"/>
+          <a:stretch>
+            <a:fillRect/>
+          </a:stretch>
+        </p:blipFill>
+        <p:spPr>
+          <a:xfrm>
+            <a:off x="8425777" y="61328"/>
+            <a:ext cx="640080" cy="640080"/>
+          </a:xfrm>
+          <a:prstGeom prst="rect">
+            <a:avLst/>
+          </a:prstGeom>
+        </p:spPr>
+      </p:pic>
     </p:spTree>
+  </p:cSld>
+  <p:clrMapOvr>
+    <a:masterClrMapping/>
+  </p:clrMapOvr>
+</p:sld>
+</file>
+
+<file path=ppt/slides/slide5.xml><?xml version="1.0" encoding="utf-8"?>
+<p:sld xmlns:a="http://schemas.openxmlformats.org/drawingml/2006/main" xmlns:r="http://schemas.openxmlformats.org/officeDocument/2006/relationships" xmlns:p="http://schemas.openxmlformats.org/presentationml/2006/main">
+  <p:cSld>
+    <p:spTree>
+      <p:nvGrpSpPr>
+        <p:cNvPr id="1" name="">
+          <a:extLst>
+            <a:ext uri="{FF2B5EF4-FFF2-40B4-BE49-F238E27FC236}">
+              <a16:creationId xmlns:a16="http://schemas.microsoft.com/office/drawing/2014/main" id="{E62C1F18-932F-4060-961F-0916EF3826A2}"/>
+            </a:ext>
+          </a:extLst>
+        </p:cNvPr>
+        <p:cNvGrpSpPr/>
+        <p:nvPr/>
+      </p:nvGrpSpPr>
+      <p:grpSpPr>
+        <a:xfrm>
+          <a:off x="0" y="0"/>
+          <a:ext cx="0" cy="0"/>
+          <a:chOff x="0" y="0"/>
+          <a:chExt cx="0" cy="0"/>
+        </a:xfrm>
+      </p:grpSpPr>
+      <p:sp>
+        <p:nvSpPr>
+          <p:cNvPr id="2" name="Title 1">
+            <a:extLst>
+              <a:ext uri="{FF2B5EF4-FFF2-40B4-BE49-F238E27FC236}">
+                <a16:creationId xmlns:a16="http://schemas.microsoft.com/office/drawing/2014/main" id="{14953371-84F0-6AC0-9182-515D74E02ADF}"/>
+              </a:ext>
+            </a:extLst>
+          </p:cNvPr>
+          <p:cNvSpPr>
+            <a:spLocks noGrp="1"/>
+          </p:cNvSpPr>
+          <p:nvPr>
+            <p:ph type="title"/>
+          </p:nvPr>
+        </p:nvSpPr>
+        <p:spPr/>
+        <p:txBody>
+          <a:bodyPr>
+            <a:normAutofit/>
+          </a:bodyPr>
+          <a:lstStyle/>
+          <a:p>
+            <a:r>
+              <a:rPr lang="en-US" sz="3200" b="1" dirty="0">
+                <a:solidFill>
+                  <a:srgbClr val="007BD0"/>
+                </a:solidFill>
+              </a:rPr>
+              <a:t>Under The Hood</a:t>
+            </a:r>
+            <a:endParaRPr sz="3200" b="1" dirty="0">
+              <a:solidFill>
+                <a:srgbClr val="007BD0"/>
+              </a:solidFill>
+            </a:endParaRPr>
+          </a:p>
+        </p:txBody>
+      </p:sp>
+      <p:grpSp>
+        <p:nvGrpSpPr>
+          <p:cNvPr id="45" name="Group 44">
+            <a:extLst>
+              <a:ext uri="{FF2B5EF4-FFF2-40B4-BE49-F238E27FC236}">
+                <a16:creationId xmlns:a16="http://schemas.microsoft.com/office/drawing/2014/main" id="{E7415191-0503-FFCA-380B-714AA83E9767}"/>
+              </a:ext>
+            </a:extLst>
+          </p:cNvPr>
+          <p:cNvGrpSpPr/>
+          <p:nvPr/>
+        </p:nvGrpSpPr>
+        <p:grpSpPr>
+          <a:xfrm>
+            <a:off x="718223" y="61328"/>
+            <a:ext cx="7707554" cy="457200"/>
+            <a:chOff x="274320" y="182880"/>
+            <a:chExt cx="7707554" cy="457200"/>
+          </a:xfrm>
+        </p:grpSpPr>
+        <p:sp>
+          <p:nvSpPr>
+            <p:cNvPr id="4" name="Isosceles Triangle 3">
+              <a:extLst>
+                <a:ext uri="{FF2B5EF4-FFF2-40B4-BE49-F238E27FC236}">
+                  <a16:creationId xmlns:a16="http://schemas.microsoft.com/office/drawing/2014/main" id="{6FA49C00-7607-C08F-9FCC-2E06B254ECCB}"/>
+                </a:ext>
+              </a:extLst>
+            </p:cNvPr>
+            <p:cNvSpPr/>
+            <p:nvPr/>
+          </p:nvSpPr>
+          <p:spPr>
+            <a:xfrm rot="10800000">
+              <a:off x="274320" y="182880"/>
+              <a:ext cx="640080" cy="457200"/>
+            </a:xfrm>
+            <a:prstGeom prst="triangle">
+              <a:avLst/>
+            </a:prstGeom>
+            <a:solidFill>
+              <a:srgbClr val="FFCB05"/>
+            </a:solidFill>
+            <a:ln>
+              <a:noFill/>
+            </a:ln>
+          </p:spPr>
+          <p:style>
+            <a:lnRef idx="1">
+              <a:schemeClr val="accent1"/>
+            </a:lnRef>
+            <a:fillRef idx="3">
+              <a:schemeClr val="accent1"/>
+            </a:fillRef>
+            <a:effectRef idx="2">
+              <a:schemeClr val="accent1"/>
+            </a:effectRef>
+            <a:fontRef idx="minor">
+              <a:schemeClr val="lt1"/>
+            </a:fontRef>
+          </p:style>
+          <p:txBody>
+            <a:bodyPr rtlCol="0" anchor="ctr"/>
+            <a:lstStyle/>
+            <a:p>
+              <a:pPr algn="ctr"/>
+              <a:endParaRPr/>
+            </a:p>
+          </p:txBody>
+        </p:sp>
+        <p:sp>
+          <p:nvSpPr>
+            <p:cNvPr id="5" name="Isosceles Triangle 4">
+              <a:extLst>
+                <a:ext uri="{FF2B5EF4-FFF2-40B4-BE49-F238E27FC236}">
+                  <a16:creationId xmlns:a16="http://schemas.microsoft.com/office/drawing/2014/main" id="{FBA002B2-1E39-0F6E-9AF2-60ADFACCC3A0}"/>
+                </a:ext>
+              </a:extLst>
+            </p:cNvPr>
+            <p:cNvSpPr/>
+            <p:nvPr/>
+          </p:nvSpPr>
+          <p:spPr>
+            <a:xfrm rot="10800000">
+              <a:off x="914400" y="182880"/>
+              <a:ext cx="640080" cy="457200"/>
+            </a:xfrm>
+            <a:prstGeom prst="triangle">
+              <a:avLst/>
+            </a:prstGeom>
+            <a:solidFill>
+              <a:srgbClr val="87CEFA"/>
+            </a:solidFill>
+            <a:ln>
+              <a:noFill/>
+            </a:ln>
+          </p:spPr>
+          <p:style>
+            <a:lnRef idx="1">
+              <a:schemeClr val="accent1"/>
+            </a:lnRef>
+            <a:fillRef idx="3">
+              <a:schemeClr val="accent1"/>
+            </a:fillRef>
+            <a:effectRef idx="2">
+              <a:schemeClr val="accent1"/>
+            </a:effectRef>
+            <a:fontRef idx="minor">
+              <a:schemeClr val="lt1"/>
+            </a:fontRef>
+          </p:style>
+          <p:txBody>
+            <a:bodyPr rtlCol="0" anchor="ctr"/>
+            <a:lstStyle/>
+            <a:p>
+              <a:pPr algn="ctr"/>
+              <a:endParaRPr dirty="0"/>
+            </a:p>
+          </p:txBody>
+        </p:sp>
+        <p:sp>
+          <p:nvSpPr>
+            <p:cNvPr id="6" name="Isosceles Triangle 5">
+              <a:extLst>
+                <a:ext uri="{FF2B5EF4-FFF2-40B4-BE49-F238E27FC236}">
+                  <a16:creationId xmlns:a16="http://schemas.microsoft.com/office/drawing/2014/main" id="{9A0294A1-2AF9-64A7-B410-B8044BFB312E}"/>
+                </a:ext>
+              </a:extLst>
+            </p:cNvPr>
+            <p:cNvSpPr/>
+            <p:nvPr/>
+          </p:nvSpPr>
+          <p:spPr>
+            <a:xfrm rot="10800000">
+              <a:off x="1554480" y="182880"/>
+              <a:ext cx="640080" cy="457200"/>
+            </a:xfrm>
+            <a:prstGeom prst="triangle">
+              <a:avLst/>
+            </a:prstGeom>
+            <a:solidFill>
+              <a:srgbClr val="FFB6C1"/>
+            </a:solidFill>
+            <a:ln>
+              <a:noFill/>
+            </a:ln>
+          </p:spPr>
+          <p:style>
+            <a:lnRef idx="1">
+              <a:schemeClr val="accent1"/>
+            </a:lnRef>
+            <a:fillRef idx="3">
+              <a:schemeClr val="accent1"/>
+            </a:fillRef>
+            <a:effectRef idx="2">
+              <a:schemeClr val="accent1"/>
+            </a:effectRef>
+            <a:fontRef idx="minor">
+              <a:schemeClr val="lt1"/>
+            </a:fontRef>
+          </p:style>
+          <p:txBody>
+            <a:bodyPr rtlCol="0" anchor="ctr"/>
+            <a:lstStyle/>
+            <a:p>
+              <a:pPr algn="ctr"/>
+              <a:endParaRPr/>
+            </a:p>
+          </p:txBody>
+        </p:sp>
+        <p:sp>
+          <p:nvSpPr>
+            <p:cNvPr id="7" name="Isosceles Triangle 6">
+              <a:extLst>
+                <a:ext uri="{FF2B5EF4-FFF2-40B4-BE49-F238E27FC236}">
+                  <a16:creationId xmlns:a16="http://schemas.microsoft.com/office/drawing/2014/main" id="{5376042A-C73C-F99E-36D1-28BAE309C3FB}"/>
+                </a:ext>
+              </a:extLst>
+            </p:cNvPr>
+            <p:cNvSpPr/>
+            <p:nvPr/>
+          </p:nvSpPr>
+          <p:spPr>
+            <a:xfrm rot="10800000">
+              <a:off x="2194560" y="182880"/>
+              <a:ext cx="640080" cy="457200"/>
+            </a:xfrm>
+            <a:prstGeom prst="triangle">
+              <a:avLst/>
+            </a:prstGeom>
+            <a:solidFill>
+              <a:srgbClr val="FFCB05"/>
+            </a:solidFill>
+            <a:ln>
+              <a:noFill/>
+            </a:ln>
+          </p:spPr>
+          <p:style>
+            <a:lnRef idx="1">
+              <a:schemeClr val="accent1"/>
+            </a:lnRef>
+            <a:fillRef idx="3">
+              <a:schemeClr val="accent1"/>
+            </a:fillRef>
+            <a:effectRef idx="2">
+              <a:schemeClr val="accent1"/>
+            </a:effectRef>
+            <a:fontRef idx="minor">
+              <a:schemeClr val="lt1"/>
+            </a:fontRef>
+          </p:style>
+          <p:txBody>
+            <a:bodyPr rtlCol="0" anchor="ctr"/>
+            <a:lstStyle/>
+            <a:p>
+              <a:pPr algn="ctr"/>
+              <a:endParaRPr/>
+            </a:p>
+          </p:txBody>
+        </p:sp>
+        <p:sp>
+          <p:nvSpPr>
+            <p:cNvPr id="8" name="Isosceles Triangle 7">
+              <a:extLst>
+                <a:ext uri="{FF2B5EF4-FFF2-40B4-BE49-F238E27FC236}">
+                  <a16:creationId xmlns:a16="http://schemas.microsoft.com/office/drawing/2014/main" id="{6C7EAF7A-512C-C16B-A24F-485EAF1B6EB5}"/>
+                </a:ext>
+              </a:extLst>
+            </p:cNvPr>
+            <p:cNvSpPr/>
+            <p:nvPr/>
+          </p:nvSpPr>
+          <p:spPr>
+            <a:xfrm rot="10800000">
+              <a:off x="2834640" y="182880"/>
+              <a:ext cx="640080" cy="457200"/>
+            </a:xfrm>
+            <a:prstGeom prst="triangle">
+              <a:avLst/>
+            </a:prstGeom>
+            <a:solidFill>
+              <a:srgbClr val="87CEFA"/>
+            </a:solidFill>
+            <a:ln>
+              <a:noFill/>
+            </a:ln>
+          </p:spPr>
+          <p:style>
+            <a:lnRef idx="1">
+              <a:schemeClr val="accent1"/>
+            </a:lnRef>
+            <a:fillRef idx="3">
+              <a:schemeClr val="accent1"/>
+            </a:fillRef>
+            <a:effectRef idx="2">
+              <a:schemeClr val="accent1"/>
+            </a:effectRef>
+            <a:fontRef idx="minor">
+              <a:schemeClr val="lt1"/>
+            </a:fontRef>
+          </p:style>
+          <p:txBody>
+            <a:bodyPr rtlCol="0" anchor="ctr"/>
+            <a:lstStyle/>
+            <a:p>
+              <a:pPr algn="ctr"/>
+              <a:endParaRPr/>
+            </a:p>
+          </p:txBody>
+        </p:sp>
+        <p:sp>
+          <p:nvSpPr>
+            <p:cNvPr id="9" name="Isosceles Triangle 8">
+              <a:extLst>
+                <a:ext uri="{FF2B5EF4-FFF2-40B4-BE49-F238E27FC236}">
+                  <a16:creationId xmlns:a16="http://schemas.microsoft.com/office/drawing/2014/main" id="{3264092F-2A08-CF69-5335-4D2809D7E672}"/>
+                </a:ext>
+              </a:extLst>
+            </p:cNvPr>
+            <p:cNvSpPr/>
+            <p:nvPr/>
+          </p:nvSpPr>
+          <p:spPr>
+            <a:xfrm rot="10800000">
+              <a:off x="3474720" y="182880"/>
+              <a:ext cx="640080" cy="457200"/>
+            </a:xfrm>
+            <a:prstGeom prst="triangle">
+              <a:avLst/>
+            </a:prstGeom>
+            <a:solidFill>
+              <a:srgbClr val="FFB6C1"/>
+            </a:solidFill>
+            <a:ln>
+              <a:noFill/>
+            </a:ln>
+          </p:spPr>
+          <p:style>
+            <a:lnRef idx="1">
+              <a:schemeClr val="accent1"/>
+            </a:lnRef>
+            <a:fillRef idx="3">
+              <a:schemeClr val="accent1"/>
+            </a:fillRef>
+            <a:effectRef idx="2">
+              <a:schemeClr val="accent1"/>
+            </a:effectRef>
+            <a:fontRef idx="minor">
+              <a:schemeClr val="lt1"/>
+            </a:fontRef>
+          </p:style>
+          <p:txBody>
+            <a:bodyPr rtlCol="0" anchor="ctr"/>
+            <a:lstStyle/>
+            <a:p>
+              <a:pPr algn="ctr"/>
+              <a:endParaRPr/>
+            </a:p>
+          </p:txBody>
+        </p:sp>
+        <p:sp>
+          <p:nvSpPr>
+            <p:cNvPr id="3" name="Isosceles Triangle 2">
+              <a:extLst>
+                <a:ext uri="{FF2B5EF4-FFF2-40B4-BE49-F238E27FC236}">
+                  <a16:creationId xmlns:a16="http://schemas.microsoft.com/office/drawing/2014/main" id="{B130721C-0D5C-754D-C692-36D4D94B4F58}"/>
+                </a:ext>
+              </a:extLst>
+            </p:cNvPr>
+            <p:cNvSpPr/>
+            <p:nvPr/>
+          </p:nvSpPr>
+          <p:spPr>
+            <a:xfrm rot="10800000">
+              <a:off x="4141394" y="182880"/>
+              <a:ext cx="640080" cy="457200"/>
+            </a:xfrm>
+            <a:prstGeom prst="triangle">
+              <a:avLst/>
+            </a:prstGeom>
+            <a:solidFill>
+              <a:srgbClr val="FFCB05"/>
+            </a:solidFill>
+            <a:ln>
+              <a:noFill/>
+            </a:ln>
+          </p:spPr>
+          <p:style>
+            <a:lnRef idx="1">
+              <a:schemeClr val="accent1"/>
+            </a:lnRef>
+            <a:fillRef idx="3">
+              <a:schemeClr val="accent1"/>
+            </a:fillRef>
+            <a:effectRef idx="2">
+              <a:schemeClr val="accent1"/>
+            </a:effectRef>
+            <a:fontRef idx="minor">
+              <a:schemeClr val="lt1"/>
+            </a:fontRef>
+          </p:style>
+          <p:txBody>
+            <a:bodyPr rtlCol="0" anchor="ctr"/>
+            <a:lstStyle/>
+            <a:p>
+              <a:pPr algn="ctr"/>
+              <a:endParaRPr/>
+            </a:p>
+          </p:txBody>
+        </p:sp>
+        <p:sp>
+          <p:nvSpPr>
+            <p:cNvPr id="40" name="Isosceles Triangle 39">
+              <a:extLst>
+                <a:ext uri="{FF2B5EF4-FFF2-40B4-BE49-F238E27FC236}">
+                  <a16:creationId xmlns:a16="http://schemas.microsoft.com/office/drawing/2014/main" id="{D090CA32-016C-711F-52C7-CD0D1944AC6C}"/>
+                </a:ext>
+              </a:extLst>
+            </p:cNvPr>
+            <p:cNvSpPr/>
+            <p:nvPr/>
+          </p:nvSpPr>
+          <p:spPr>
+            <a:xfrm rot="10800000">
+              <a:off x="4781474" y="182880"/>
+              <a:ext cx="640080" cy="457200"/>
+            </a:xfrm>
+            <a:prstGeom prst="triangle">
+              <a:avLst/>
+            </a:prstGeom>
+            <a:solidFill>
+              <a:srgbClr val="87CEFA"/>
+            </a:solidFill>
+            <a:ln>
+              <a:noFill/>
+            </a:ln>
+          </p:spPr>
+          <p:style>
+            <a:lnRef idx="1">
+              <a:schemeClr val="accent1"/>
+            </a:lnRef>
+            <a:fillRef idx="3">
+              <a:schemeClr val="accent1"/>
+            </a:fillRef>
+            <a:effectRef idx="2">
+              <a:schemeClr val="accent1"/>
+            </a:effectRef>
+            <a:fontRef idx="minor">
+              <a:schemeClr val="lt1"/>
+            </a:fontRef>
+          </p:style>
+          <p:txBody>
+            <a:bodyPr rtlCol="0" anchor="ctr"/>
+            <a:lstStyle/>
+            <a:p>
+              <a:pPr algn="ctr"/>
+              <a:endParaRPr/>
+            </a:p>
+          </p:txBody>
+        </p:sp>
+        <p:sp>
+          <p:nvSpPr>
+            <p:cNvPr id="41" name="Isosceles Triangle 40">
+              <a:extLst>
+                <a:ext uri="{FF2B5EF4-FFF2-40B4-BE49-F238E27FC236}">
+                  <a16:creationId xmlns:a16="http://schemas.microsoft.com/office/drawing/2014/main" id="{F88CE87F-7C7A-89D7-7124-07D061F75B1C}"/>
+                </a:ext>
+              </a:extLst>
+            </p:cNvPr>
+            <p:cNvSpPr/>
+            <p:nvPr/>
+          </p:nvSpPr>
+          <p:spPr>
+            <a:xfrm rot="10800000">
+              <a:off x="5421554" y="182880"/>
+              <a:ext cx="640080" cy="457200"/>
+            </a:xfrm>
+            <a:prstGeom prst="triangle">
+              <a:avLst/>
+            </a:prstGeom>
+            <a:solidFill>
+              <a:srgbClr val="FFB6C1"/>
+            </a:solidFill>
+            <a:ln>
+              <a:noFill/>
+            </a:ln>
+          </p:spPr>
+          <p:style>
+            <a:lnRef idx="1">
+              <a:schemeClr val="accent1"/>
+            </a:lnRef>
+            <a:fillRef idx="3">
+              <a:schemeClr val="accent1"/>
+            </a:fillRef>
+            <a:effectRef idx="2">
+              <a:schemeClr val="accent1"/>
+            </a:effectRef>
+            <a:fontRef idx="minor">
+              <a:schemeClr val="lt1"/>
+            </a:fontRef>
+          </p:style>
+          <p:txBody>
+            <a:bodyPr rtlCol="0" anchor="ctr"/>
+            <a:lstStyle/>
+            <a:p>
+              <a:pPr algn="ctr"/>
+              <a:endParaRPr/>
+            </a:p>
+          </p:txBody>
+        </p:sp>
+        <p:sp>
+          <p:nvSpPr>
+            <p:cNvPr id="42" name="Isosceles Triangle 41">
+              <a:extLst>
+                <a:ext uri="{FF2B5EF4-FFF2-40B4-BE49-F238E27FC236}">
+                  <a16:creationId xmlns:a16="http://schemas.microsoft.com/office/drawing/2014/main" id="{DDA7660E-8AC3-F261-0659-22A23C8CE8EB}"/>
+                </a:ext>
+              </a:extLst>
+            </p:cNvPr>
+            <p:cNvSpPr/>
+            <p:nvPr/>
+          </p:nvSpPr>
+          <p:spPr>
+            <a:xfrm rot="10800000">
+              <a:off x="6061634" y="182880"/>
+              <a:ext cx="640080" cy="457200"/>
+            </a:xfrm>
+            <a:prstGeom prst="triangle">
+              <a:avLst/>
+            </a:prstGeom>
+            <a:solidFill>
+              <a:srgbClr val="FFCB05"/>
+            </a:solidFill>
+            <a:ln>
+              <a:noFill/>
+            </a:ln>
+          </p:spPr>
+          <p:style>
+            <a:lnRef idx="1">
+              <a:schemeClr val="accent1"/>
+            </a:lnRef>
+            <a:fillRef idx="3">
+              <a:schemeClr val="accent1"/>
+            </a:fillRef>
+            <a:effectRef idx="2">
+              <a:schemeClr val="accent1"/>
+            </a:effectRef>
+            <a:fontRef idx="minor">
+              <a:schemeClr val="lt1"/>
+            </a:fontRef>
+          </p:style>
+          <p:txBody>
+            <a:bodyPr rtlCol="0" anchor="ctr"/>
+            <a:lstStyle/>
+            <a:p>
+              <a:pPr algn="ctr"/>
+              <a:endParaRPr/>
+            </a:p>
+          </p:txBody>
+        </p:sp>
+        <p:sp>
+          <p:nvSpPr>
+            <p:cNvPr id="43" name="Isosceles Triangle 42">
+              <a:extLst>
+                <a:ext uri="{FF2B5EF4-FFF2-40B4-BE49-F238E27FC236}">
+                  <a16:creationId xmlns:a16="http://schemas.microsoft.com/office/drawing/2014/main" id="{1A2C97BC-799C-1B6A-5E1A-1B61346A3B05}"/>
+                </a:ext>
+              </a:extLst>
+            </p:cNvPr>
+            <p:cNvSpPr/>
+            <p:nvPr/>
+          </p:nvSpPr>
+          <p:spPr>
+            <a:xfrm rot="10800000">
+              <a:off x="6701714" y="182880"/>
+              <a:ext cx="640080" cy="457200"/>
+            </a:xfrm>
+            <a:prstGeom prst="triangle">
+              <a:avLst/>
+            </a:prstGeom>
+            <a:solidFill>
+              <a:srgbClr val="87CEFA"/>
+            </a:solidFill>
+            <a:ln>
+              <a:noFill/>
+            </a:ln>
+          </p:spPr>
+          <p:style>
+            <a:lnRef idx="1">
+              <a:schemeClr val="accent1"/>
+            </a:lnRef>
+            <a:fillRef idx="3">
+              <a:schemeClr val="accent1"/>
+            </a:fillRef>
+            <a:effectRef idx="2">
+              <a:schemeClr val="accent1"/>
+            </a:effectRef>
+            <a:fontRef idx="minor">
+              <a:schemeClr val="lt1"/>
+            </a:fontRef>
+          </p:style>
+          <p:txBody>
+            <a:bodyPr rtlCol="0" anchor="ctr"/>
+            <a:lstStyle/>
+            <a:p>
+              <a:pPr algn="ctr"/>
+              <a:endParaRPr/>
+            </a:p>
+          </p:txBody>
+        </p:sp>
+        <p:sp>
+          <p:nvSpPr>
+            <p:cNvPr id="44" name="Isosceles Triangle 43">
+              <a:extLst>
+                <a:ext uri="{FF2B5EF4-FFF2-40B4-BE49-F238E27FC236}">
+                  <a16:creationId xmlns:a16="http://schemas.microsoft.com/office/drawing/2014/main" id="{E066F4CB-002D-7A82-7D58-DEAD40E79AAF}"/>
+                </a:ext>
+              </a:extLst>
+            </p:cNvPr>
+            <p:cNvSpPr/>
+            <p:nvPr/>
+          </p:nvSpPr>
+          <p:spPr>
+            <a:xfrm rot="10800000">
+              <a:off x="7341794" y="182880"/>
+              <a:ext cx="640080" cy="457200"/>
+            </a:xfrm>
+            <a:prstGeom prst="triangle">
+              <a:avLst/>
+            </a:prstGeom>
+            <a:solidFill>
+              <a:srgbClr val="FFB6C1"/>
+            </a:solidFill>
+            <a:ln>
+              <a:noFill/>
+            </a:ln>
+          </p:spPr>
+          <p:style>
+            <a:lnRef idx="1">
+              <a:schemeClr val="accent1"/>
+            </a:lnRef>
+            <a:fillRef idx="3">
+              <a:schemeClr val="accent1"/>
+            </a:fillRef>
+            <a:effectRef idx="2">
+              <a:schemeClr val="accent1"/>
+            </a:effectRef>
+            <a:fontRef idx="minor">
+              <a:schemeClr val="lt1"/>
+            </a:fontRef>
+          </p:style>
+          <p:txBody>
+            <a:bodyPr rtlCol="0" anchor="ctr"/>
+            <a:lstStyle/>
+            <a:p>
+              <a:pPr algn="ctr"/>
+              <a:endParaRPr/>
+            </a:p>
+          </p:txBody>
+        </p:sp>
+      </p:grpSp>
+      <p:pic>
+        <p:nvPicPr>
+          <p:cNvPr id="16" name="Picture 15">
+            <a:extLst>
+              <a:ext uri="{FF2B5EF4-FFF2-40B4-BE49-F238E27FC236}">
+                <a16:creationId xmlns:a16="http://schemas.microsoft.com/office/drawing/2014/main" id="{2EEE2010-E1D2-8860-3E0B-25FAB28A4058}"/>
+              </a:ext>
+            </a:extLst>
+          </p:cNvPr>
+          <p:cNvPicPr>
+            <a:picLocks noChangeAspect="1"/>
+          </p:cNvPicPr>
+          <p:nvPr/>
+        </p:nvPicPr>
+        <p:blipFill>
+          <a:blip r:embed="rId2"/>
+          <a:stretch>
+            <a:fillRect/>
+          </a:stretch>
+        </p:blipFill>
+        <p:spPr>
+          <a:xfrm>
+            <a:off x="0" y="1256377"/>
+            <a:ext cx="9144000" cy="4345245"/>
+          </a:xfrm>
+          <a:prstGeom prst="rect">
+            <a:avLst/>
+          </a:prstGeom>
+        </p:spPr>
+      </p:pic>
+      <p:pic>
+        <p:nvPicPr>
+          <p:cNvPr id="24" name="Picture 23">
+            <a:extLst>
+              <a:ext uri="{FF2B5EF4-FFF2-40B4-BE49-F238E27FC236}">
+                <a16:creationId xmlns:a16="http://schemas.microsoft.com/office/drawing/2014/main" id="{A5092C9A-631F-5730-04BD-A75289465B47}"/>
+              </a:ext>
+            </a:extLst>
+          </p:cNvPr>
+          <p:cNvPicPr>
+            <a:picLocks noChangeAspect="1"/>
+          </p:cNvPicPr>
+          <p:nvPr/>
+        </p:nvPicPr>
+        <p:blipFill>
+          <a:blip r:embed="rId3"/>
+          <a:stretch>
+            <a:fillRect/>
+          </a:stretch>
+        </p:blipFill>
+        <p:spPr>
+          <a:xfrm>
+            <a:off x="0" y="1196830"/>
+            <a:ext cx="9144000" cy="4464339"/>
+          </a:xfrm>
+          <a:prstGeom prst="rect">
+            <a:avLst/>
+          </a:prstGeom>
+        </p:spPr>
+      </p:pic>
+      <p:pic>
+        <p:nvPicPr>
+          <p:cNvPr id="29" name="Picture 28" descr="logo.png">
+            <a:extLst>
+              <a:ext uri="{FF2B5EF4-FFF2-40B4-BE49-F238E27FC236}">
+                <a16:creationId xmlns:a16="http://schemas.microsoft.com/office/drawing/2014/main" id="{8FDC8C7B-28A3-452C-C9F5-12642917BFEA}"/>
+              </a:ext>
+            </a:extLst>
+          </p:cNvPr>
+          <p:cNvPicPr>
+            <a:picLocks noChangeAspect="1"/>
+          </p:cNvPicPr>
+          <p:nvPr/>
+        </p:nvPicPr>
+        <p:blipFill>
+          <a:blip r:embed="rId4"/>
+          <a:stretch>
+            <a:fillRect/>
+          </a:stretch>
+        </p:blipFill>
+        <p:spPr>
+          <a:xfrm>
+            <a:off x="83416" y="72390"/>
+            <a:ext cx="640080" cy="640080"/>
+          </a:xfrm>
+          <a:prstGeom prst="rect">
+            <a:avLst/>
+          </a:prstGeom>
+        </p:spPr>
+      </p:pic>
+      <p:pic>
+        <p:nvPicPr>
+          <p:cNvPr id="34" name="Picture 33" descr="logo.png">
+            <a:extLst>
+              <a:ext uri="{FF2B5EF4-FFF2-40B4-BE49-F238E27FC236}">
+                <a16:creationId xmlns:a16="http://schemas.microsoft.com/office/drawing/2014/main" id="{ECD88584-42C5-5037-63D2-08C47C930F43}"/>
+              </a:ext>
+            </a:extLst>
+          </p:cNvPr>
+          <p:cNvPicPr>
+            <a:picLocks noChangeAspect="1"/>
+          </p:cNvPicPr>
+          <p:nvPr/>
+        </p:nvPicPr>
+        <p:blipFill>
+          <a:blip r:embed="rId4"/>
+          <a:stretch>
+            <a:fillRect/>
+          </a:stretch>
+        </p:blipFill>
+        <p:spPr>
+          <a:xfrm>
+            <a:off x="8425777" y="61327"/>
+            <a:ext cx="640080" cy="640080"/>
+          </a:xfrm>
+          <a:prstGeom prst="rect">
+            <a:avLst/>
+          </a:prstGeom>
+        </p:spPr>
+      </p:pic>
+    </p:spTree>
+    <p:extLst>
+      <p:ext uri="{BB962C8B-B14F-4D97-AF65-F5344CB8AC3E}">
+        <p14:creationId xmlns:p14="http://schemas.microsoft.com/office/powerpoint/2010/main" val="1484965981"/>
+      </p:ext>
+    </p:extLst>
+  </p:cSld>
+  <p:clrMapOvr>
+    <a:masterClrMapping/>
+  </p:clrMapOvr>
+</p:sld>
+</file>
+
+<file path=ppt/slides/slide6.xml><?xml version="1.0" encoding="utf-8"?>
+<p:sld xmlns:a="http://schemas.openxmlformats.org/drawingml/2006/main" xmlns:r="http://schemas.openxmlformats.org/officeDocument/2006/relationships" xmlns:p="http://schemas.openxmlformats.org/presentationml/2006/main">
+  <p:cSld>
+    <p:bg>
+      <p:bgPr>
+        <a:solidFill>
+          <a:schemeClr val="bg1"/>
+        </a:solidFill>
+        <a:effectLst/>
+      </p:bgPr>
+    </p:bg>
+    <p:spTree>
+      <p:nvGrpSpPr>
+        <p:cNvPr id="1" name="">
+          <a:extLst>
+            <a:ext uri="{FF2B5EF4-FFF2-40B4-BE49-F238E27FC236}">
+              <a16:creationId xmlns:a16="http://schemas.microsoft.com/office/drawing/2014/main" id="{B030BCDE-03EF-99D4-F255-DA997A01BF88}"/>
+            </a:ext>
+          </a:extLst>
+        </p:cNvPr>
+        <p:cNvGrpSpPr/>
+        <p:nvPr/>
+      </p:nvGrpSpPr>
+      <p:grpSpPr>
+        <a:xfrm>
+          <a:off x="0" y="0"/>
+          <a:ext cx="0" cy="0"/>
+          <a:chOff x="0" y="0"/>
+          <a:chExt cx="0" cy="0"/>
+        </a:xfrm>
+      </p:grpSpPr>
+      <p:sp useBgFill="1">
+        <p:nvSpPr>
+          <p:cNvPr id="27" name="Rectangle 26">
+            <a:extLst>
+              <a:ext uri="{FF2B5EF4-FFF2-40B4-BE49-F238E27FC236}">
+                <a16:creationId xmlns:a16="http://schemas.microsoft.com/office/drawing/2014/main" id="{04812C46-200A-4DEB-A05E-3ED6C68C2387}"/>
+              </a:ext>
+              <a:ext uri="{C183D7F6-B498-43B3-948B-1728B52AA6E4}">
+                <adec:decorative xmlns:adec="http://schemas.microsoft.com/office/drawing/2017/decorative" val="1"/>
+              </a:ext>
+            </a:extLst>
+          </p:cNvPr>
+          <p:cNvSpPr>
+            <a:spLocks noGrp="1" noRot="1" noChangeAspect="1" noMove="1" noResize="1" noEditPoints="1" noAdjustHandles="1" noChangeArrowheads="1" noChangeShapeType="1" noTextEdit="1"/>
+          </p:cNvSpPr>
+          <p:nvPr>
+            <p:extLst>
+              <p:ext uri="{386F3935-93C4-4BCD-93E2-E3B085C9AB24}">
+                <p16:designElem xmlns:p16="http://schemas.microsoft.com/office/powerpoint/2015/main" val="1"/>
+              </p:ext>
+            </p:extLst>
+          </p:nvPr>
+        </p:nvSpPr>
+        <p:spPr>
+          <a:xfrm>
+            <a:off x="2286" y="0"/>
+            <a:ext cx="9141714" cy="6858000"/>
+          </a:xfrm>
+          <a:prstGeom prst="rect">
+            <a:avLst/>
+          </a:prstGeom>
+          <a:ln>
+            <a:noFill/>
+          </a:ln>
+        </p:spPr>
+        <p:style>
+          <a:lnRef idx="2">
+            <a:schemeClr val="accent1">
+              <a:shade val="50000"/>
+            </a:schemeClr>
+          </a:lnRef>
+          <a:fillRef idx="1">
+            <a:schemeClr val="accent1"/>
+          </a:fillRef>
+          <a:effectRef idx="0">
+            <a:schemeClr val="accent1"/>
+          </a:effectRef>
+          <a:fontRef idx="minor">
+            <a:schemeClr val="lt1"/>
+          </a:fontRef>
+        </p:style>
+        <p:txBody>
+          <a:bodyPr rtlCol="0" anchor="ctr"/>
+          <a:lstStyle/>
+          <a:p>
+            <a:pPr algn="ctr"/>
+            <a:endParaRPr lang="en-US"/>
+          </a:p>
+        </p:txBody>
+      </p:sp>
+      <p:sp>
+        <p:nvSpPr>
+          <p:cNvPr id="28" name="Rectangle 27">
+            <a:extLst>
+              <a:ext uri="{FF2B5EF4-FFF2-40B4-BE49-F238E27FC236}">
+                <a16:creationId xmlns:a16="http://schemas.microsoft.com/office/drawing/2014/main" id="{D1EA859B-E555-4109-94F3-6700E046E008}"/>
+              </a:ext>
+              <a:ext uri="{C183D7F6-B498-43B3-948B-1728B52AA6E4}">
+                <adec:decorative xmlns:adec="http://schemas.microsoft.com/office/drawing/2017/decorative" val="1"/>
+              </a:ext>
+            </a:extLst>
+          </p:cNvPr>
+          <p:cNvSpPr>
+            <a:spLocks noGrp="1" noRot="1" noChangeAspect="1" noMove="1" noResize="1" noEditPoints="1" noAdjustHandles="1" noChangeArrowheads="1" noChangeShapeType="1" noTextEdit="1"/>
+          </p:cNvSpPr>
+          <p:nvPr>
+            <p:extLst>
+              <p:ext uri="{386F3935-93C4-4BCD-93E2-E3B085C9AB24}">
+                <p16:designElem xmlns:p16="http://schemas.microsoft.com/office/powerpoint/2015/main" val="1"/>
+              </p:ext>
+            </p:extLst>
+          </p:nvPr>
+        </p:nvSpPr>
+        <p:spPr>
+          <a:xfrm>
+            <a:off x="0" y="0"/>
+            <a:ext cx="5542696" cy="6858000"/>
+          </a:xfrm>
+          <a:prstGeom prst="rect">
+            <a:avLst/>
+          </a:prstGeom>
+          <a:gradFill>
+            <a:gsLst>
+              <a:gs pos="48000">
+                <a:schemeClr val="bg1"/>
+              </a:gs>
+              <a:gs pos="35000">
+                <a:schemeClr val="bg1">
+                  <a:alpha val="77000"/>
+                </a:schemeClr>
+              </a:gs>
+              <a:gs pos="19000">
+                <a:schemeClr val="bg1">
+                  <a:alpha val="38000"/>
+                </a:schemeClr>
+              </a:gs>
+              <a:gs pos="0">
+                <a:schemeClr val="bg1">
+                  <a:alpha val="0"/>
+                </a:schemeClr>
+              </a:gs>
+              <a:gs pos="100000">
+                <a:schemeClr val="bg1"/>
+              </a:gs>
+            </a:gsLst>
+            <a:lin ang="10800000" scaled="0"/>
+          </a:gradFill>
+          <a:ln>
+            <a:noFill/>
+          </a:ln>
+        </p:spPr>
+        <p:style>
+          <a:lnRef idx="2">
+            <a:schemeClr val="accent1">
+              <a:shade val="50000"/>
+            </a:schemeClr>
+          </a:lnRef>
+          <a:fillRef idx="1">
+            <a:schemeClr val="accent1"/>
+          </a:fillRef>
+          <a:effectRef idx="0">
+            <a:schemeClr val="accent1"/>
+          </a:effectRef>
+          <a:fontRef idx="minor">
+            <a:schemeClr val="lt1"/>
+          </a:fontRef>
+        </p:style>
+        <p:txBody>
+          <a:bodyPr rtlCol="0" anchor="ctr"/>
+          <a:lstStyle/>
+          <a:p>
+            <a:pPr algn="ctr"/>
+            <a:endParaRPr lang="en-US" dirty="0"/>
+          </a:p>
+        </p:txBody>
+      </p:sp>
+      <p:sp>
+        <p:nvSpPr>
+          <p:cNvPr id="4" name="Rounded Rectangle 2">
+            <a:extLst>
+              <a:ext uri="{FF2B5EF4-FFF2-40B4-BE49-F238E27FC236}">
+                <a16:creationId xmlns:a16="http://schemas.microsoft.com/office/drawing/2014/main" id="{57A99601-D042-3A0B-856A-A0E789E3F855}"/>
+              </a:ext>
+            </a:extLst>
+          </p:cNvPr>
+          <p:cNvSpPr/>
+          <p:nvPr/>
+        </p:nvSpPr>
+        <p:spPr>
+          <a:xfrm>
+            <a:off x="443903" y="1462380"/>
+            <a:ext cx="1828800" cy="914400"/>
+          </a:xfrm>
+          <a:prstGeom prst="roundRect">
+            <a:avLst/>
+          </a:prstGeom>
+          <a:solidFill>
+            <a:srgbClr val="FFCB05"/>
+          </a:solidFill>
+          <a:ln>
+            <a:solidFill>
+              <a:srgbClr val="505050"/>
+            </a:solidFill>
+          </a:ln>
+        </p:spPr>
+        <p:style>
+          <a:lnRef idx="1">
+            <a:schemeClr val="accent1"/>
+          </a:lnRef>
+          <a:fillRef idx="3">
+            <a:schemeClr val="accent1"/>
+          </a:fillRef>
+          <a:effectRef idx="2">
+            <a:schemeClr val="accent1"/>
+          </a:effectRef>
+          <a:fontRef idx="minor">
+            <a:schemeClr val="lt1"/>
+          </a:fontRef>
+        </p:style>
+        <p:txBody>
+          <a:bodyPr rtlCol="0" anchor="ctr"/>
+          <a:lstStyle>
+            <a:defPPr>
+              <a:defRPr lang="en-US"/>
+            </a:defPPr>
+            <a:lvl1pPr marL="0" algn="l" defTabSz="457200" rtl="0" eaLnBrk="1" latinLnBrk="0" hangingPunct="1">
+              <a:defRPr sz="1800" kern="1200">
+                <a:solidFill>
+                  <a:schemeClr val="lt1"/>
+                </a:solidFill>
+                <a:latin typeface="+mn-lt"/>
+                <a:ea typeface="+mn-ea"/>
+                <a:cs typeface="+mn-cs"/>
+              </a:defRPr>
+            </a:lvl1pPr>
+            <a:lvl2pPr marL="457200" algn="l" defTabSz="457200" rtl="0" eaLnBrk="1" latinLnBrk="0" hangingPunct="1">
+              <a:defRPr sz="1800" kern="1200">
+                <a:solidFill>
+                  <a:schemeClr val="lt1"/>
+                </a:solidFill>
+                <a:latin typeface="+mn-lt"/>
+                <a:ea typeface="+mn-ea"/>
+                <a:cs typeface="+mn-cs"/>
+              </a:defRPr>
+            </a:lvl2pPr>
+            <a:lvl3pPr marL="914400" algn="l" defTabSz="457200" rtl="0" eaLnBrk="1" latinLnBrk="0" hangingPunct="1">
+              <a:defRPr sz="1800" kern="1200">
+                <a:solidFill>
+                  <a:schemeClr val="lt1"/>
+                </a:solidFill>
+                <a:latin typeface="+mn-lt"/>
+                <a:ea typeface="+mn-ea"/>
+                <a:cs typeface="+mn-cs"/>
+              </a:defRPr>
+            </a:lvl3pPr>
+            <a:lvl4pPr marL="1371600" algn="l" defTabSz="457200" rtl="0" eaLnBrk="1" latinLnBrk="0" hangingPunct="1">
+              <a:defRPr sz="1800" kern="1200">
+                <a:solidFill>
+                  <a:schemeClr val="lt1"/>
+                </a:solidFill>
+                <a:latin typeface="+mn-lt"/>
+                <a:ea typeface="+mn-ea"/>
+                <a:cs typeface="+mn-cs"/>
+              </a:defRPr>
+            </a:lvl4pPr>
+            <a:lvl5pPr marL="1828800" algn="l" defTabSz="457200" rtl="0" eaLnBrk="1" latinLnBrk="0" hangingPunct="1">
+              <a:defRPr sz="1800" kern="1200">
+                <a:solidFill>
+                  <a:schemeClr val="lt1"/>
+                </a:solidFill>
+                <a:latin typeface="+mn-lt"/>
+                <a:ea typeface="+mn-ea"/>
+                <a:cs typeface="+mn-cs"/>
+              </a:defRPr>
+            </a:lvl5pPr>
+            <a:lvl6pPr marL="2286000" algn="l" defTabSz="457200" rtl="0" eaLnBrk="1" latinLnBrk="0" hangingPunct="1">
+              <a:defRPr sz="1800" kern="1200">
+                <a:solidFill>
+                  <a:schemeClr val="lt1"/>
+                </a:solidFill>
+                <a:latin typeface="+mn-lt"/>
+                <a:ea typeface="+mn-ea"/>
+                <a:cs typeface="+mn-cs"/>
+              </a:defRPr>
+            </a:lvl6pPr>
+            <a:lvl7pPr marL="2743200" algn="l" defTabSz="457200" rtl="0" eaLnBrk="1" latinLnBrk="0" hangingPunct="1">
+              <a:defRPr sz="1800" kern="1200">
+                <a:solidFill>
+                  <a:schemeClr val="lt1"/>
+                </a:solidFill>
+                <a:latin typeface="+mn-lt"/>
+                <a:ea typeface="+mn-ea"/>
+                <a:cs typeface="+mn-cs"/>
+              </a:defRPr>
+            </a:lvl7pPr>
+            <a:lvl8pPr marL="3200400" algn="l" defTabSz="457200" rtl="0" eaLnBrk="1" latinLnBrk="0" hangingPunct="1">
+              <a:defRPr sz="1800" kern="1200">
+                <a:solidFill>
+                  <a:schemeClr val="lt1"/>
+                </a:solidFill>
+                <a:latin typeface="+mn-lt"/>
+                <a:ea typeface="+mn-ea"/>
+                <a:cs typeface="+mn-cs"/>
+              </a:defRPr>
+            </a:lvl8pPr>
+            <a:lvl9pPr marL="3657600" algn="l" defTabSz="457200" rtl="0" eaLnBrk="1" latinLnBrk="0" hangingPunct="1">
+              <a:defRPr sz="1800" kern="1200">
+                <a:solidFill>
+                  <a:schemeClr val="lt1"/>
+                </a:solidFill>
+                <a:latin typeface="+mn-lt"/>
+                <a:ea typeface="+mn-ea"/>
+                <a:cs typeface="+mn-cs"/>
+              </a:defRPr>
+            </a:lvl9pPr>
+          </a:lstStyle>
+          <a:p>
+            <a:pPr algn="ctr">
+              <a:defRPr sz="1400" b="1"/>
+            </a:pPr>
+            <a:r>
+              <a:rPr dirty="0"/>
+              <a:t>Register New User</a:t>
+            </a:r>
+          </a:p>
+        </p:txBody>
+      </p:sp>
+      <p:sp>
+        <p:nvSpPr>
+          <p:cNvPr id="7" name="Rounded Rectangle 4">
+            <a:extLst>
+              <a:ext uri="{FF2B5EF4-FFF2-40B4-BE49-F238E27FC236}">
+                <a16:creationId xmlns:a16="http://schemas.microsoft.com/office/drawing/2014/main" id="{FD7A78A0-F75E-F981-BEF2-C4D561A2FFCE}"/>
+              </a:ext>
+            </a:extLst>
+          </p:cNvPr>
+          <p:cNvSpPr/>
+          <p:nvPr/>
+        </p:nvSpPr>
+        <p:spPr>
+          <a:xfrm>
+            <a:off x="2601608" y="2636406"/>
+            <a:ext cx="1828800" cy="914400"/>
+          </a:xfrm>
+          <a:prstGeom prst="roundRect">
+            <a:avLst/>
+          </a:prstGeom>
+          <a:solidFill>
+            <a:srgbClr val="87CEFA"/>
+          </a:solidFill>
+          <a:ln>
+            <a:solidFill>
+              <a:srgbClr val="505050"/>
+            </a:solidFill>
+          </a:ln>
+        </p:spPr>
+        <p:style>
+          <a:lnRef idx="1">
+            <a:schemeClr val="accent1"/>
+          </a:lnRef>
+          <a:fillRef idx="3">
+            <a:schemeClr val="accent1"/>
+          </a:fillRef>
+          <a:effectRef idx="2">
+            <a:schemeClr val="accent1"/>
+          </a:effectRef>
+          <a:fontRef idx="minor">
+            <a:schemeClr val="lt1"/>
+          </a:fontRef>
+        </p:style>
+        <p:txBody>
+          <a:bodyPr rtlCol="0" anchor="ctr"/>
+          <a:lstStyle>
+            <a:defPPr>
+              <a:defRPr lang="en-US"/>
+            </a:defPPr>
+            <a:lvl1pPr marL="0" algn="l" defTabSz="457200" rtl="0" eaLnBrk="1" latinLnBrk="0" hangingPunct="1">
+              <a:defRPr sz="1800" kern="1200">
+                <a:solidFill>
+                  <a:schemeClr val="lt1"/>
+                </a:solidFill>
+                <a:latin typeface="+mn-lt"/>
+                <a:ea typeface="+mn-ea"/>
+                <a:cs typeface="+mn-cs"/>
+              </a:defRPr>
+            </a:lvl1pPr>
+            <a:lvl2pPr marL="457200" algn="l" defTabSz="457200" rtl="0" eaLnBrk="1" latinLnBrk="0" hangingPunct="1">
+              <a:defRPr sz="1800" kern="1200">
+                <a:solidFill>
+                  <a:schemeClr val="lt1"/>
+                </a:solidFill>
+                <a:latin typeface="+mn-lt"/>
+                <a:ea typeface="+mn-ea"/>
+                <a:cs typeface="+mn-cs"/>
+              </a:defRPr>
+            </a:lvl2pPr>
+            <a:lvl3pPr marL="914400" algn="l" defTabSz="457200" rtl="0" eaLnBrk="1" latinLnBrk="0" hangingPunct="1">
+              <a:defRPr sz="1800" kern="1200">
+                <a:solidFill>
+                  <a:schemeClr val="lt1"/>
+                </a:solidFill>
+                <a:latin typeface="+mn-lt"/>
+                <a:ea typeface="+mn-ea"/>
+                <a:cs typeface="+mn-cs"/>
+              </a:defRPr>
+            </a:lvl3pPr>
+            <a:lvl4pPr marL="1371600" algn="l" defTabSz="457200" rtl="0" eaLnBrk="1" latinLnBrk="0" hangingPunct="1">
+              <a:defRPr sz="1800" kern="1200">
+                <a:solidFill>
+                  <a:schemeClr val="lt1"/>
+                </a:solidFill>
+                <a:latin typeface="+mn-lt"/>
+                <a:ea typeface="+mn-ea"/>
+                <a:cs typeface="+mn-cs"/>
+              </a:defRPr>
+            </a:lvl4pPr>
+            <a:lvl5pPr marL="1828800" algn="l" defTabSz="457200" rtl="0" eaLnBrk="1" latinLnBrk="0" hangingPunct="1">
+              <a:defRPr sz="1800" kern="1200">
+                <a:solidFill>
+                  <a:schemeClr val="lt1"/>
+                </a:solidFill>
+                <a:latin typeface="+mn-lt"/>
+                <a:ea typeface="+mn-ea"/>
+                <a:cs typeface="+mn-cs"/>
+              </a:defRPr>
+            </a:lvl5pPr>
+            <a:lvl6pPr marL="2286000" algn="l" defTabSz="457200" rtl="0" eaLnBrk="1" latinLnBrk="0" hangingPunct="1">
+              <a:defRPr sz="1800" kern="1200">
+                <a:solidFill>
+                  <a:schemeClr val="lt1"/>
+                </a:solidFill>
+                <a:latin typeface="+mn-lt"/>
+                <a:ea typeface="+mn-ea"/>
+                <a:cs typeface="+mn-cs"/>
+              </a:defRPr>
+            </a:lvl6pPr>
+            <a:lvl7pPr marL="2743200" algn="l" defTabSz="457200" rtl="0" eaLnBrk="1" latinLnBrk="0" hangingPunct="1">
+              <a:defRPr sz="1800" kern="1200">
+                <a:solidFill>
+                  <a:schemeClr val="lt1"/>
+                </a:solidFill>
+                <a:latin typeface="+mn-lt"/>
+                <a:ea typeface="+mn-ea"/>
+                <a:cs typeface="+mn-cs"/>
+              </a:defRPr>
+            </a:lvl7pPr>
+            <a:lvl8pPr marL="3200400" algn="l" defTabSz="457200" rtl="0" eaLnBrk="1" latinLnBrk="0" hangingPunct="1">
+              <a:defRPr sz="1800" kern="1200">
+                <a:solidFill>
+                  <a:schemeClr val="lt1"/>
+                </a:solidFill>
+                <a:latin typeface="+mn-lt"/>
+                <a:ea typeface="+mn-ea"/>
+                <a:cs typeface="+mn-cs"/>
+              </a:defRPr>
+            </a:lvl8pPr>
+            <a:lvl9pPr marL="3657600" algn="l" defTabSz="457200" rtl="0" eaLnBrk="1" latinLnBrk="0" hangingPunct="1">
+              <a:defRPr sz="1800" kern="1200">
+                <a:solidFill>
+                  <a:schemeClr val="lt1"/>
+                </a:solidFill>
+                <a:latin typeface="+mn-lt"/>
+                <a:ea typeface="+mn-ea"/>
+                <a:cs typeface="+mn-cs"/>
+              </a:defRPr>
+            </a:lvl9pPr>
+          </a:lstStyle>
+          <a:p>
+            <a:pPr algn="ctr">
+              <a:defRPr sz="1400" b="1"/>
+            </a:pPr>
+            <a:r>
+              <a:rPr dirty="0"/>
+              <a:t>Get Birthdays in Workspace</a:t>
+            </a:r>
+          </a:p>
+        </p:txBody>
+      </p:sp>
+      <p:sp>
+        <p:nvSpPr>
+          <p:cNvPr id="10" name="Rounded Rectangle 6">
+            <a:extLst>
+              <a:ext uri="{FF2B5EF4-FFF2-40B4-BE49-F238E27FC236}">
+                <a16:creationId xmlns:a16="http://schemas.microsoft.com/office/drawing/2014/main" id="{FEC73F2E-15E2-6688-8E2F-78BEBDBF1B26}"/>
+              </a:ext>
+            </a:extLst>
+          </p:cNvPr>
+          <p:cNvSpPr/>
+          <p:nvPr/>
+        </p:nvSpPr>
+        <p:spPr>
+          <a:xfrm>
+            <a:off x="4835397" y="3875027"/>
+            <a:ext cx="1828800" cy="914400"/>
+          </a:xfrm>
+          <a:prstGeom prst="roundRect">
+            <a:avLst/>
+          </a:prstGeom>
+          <a:solidFill>
+            <a:srgbClr val="FFB6C1"/>
+          </a:solidFill>
+          <a:ln>
+            <a:solidFill>
+              <a:srgbClr val="505050"/>
+            </a:solidFill>
+          </a:ln>
+        </p:spPr>
+        <p:style>
+          <a:lnRef idx="1">
+            <a:schemeClr val="accent1"/>
+          </a:lnRef>
+          <a:fillRef idx="3">
+            <a:schemeClr val="accent1"/>
+          </a:fillRef>
+          <a:effectRef idx="2">
+            <a:schemeClr val="accent1"/>
+          </a:effectRef>
+          <a:fontRef idx="minor">
+            <a:schemeClr val="lt1"/>
+          </a:fontRef>
+        </p:style>
+        <p:txBody>
+          <a:bodyPr rtlCol="0" anchor="ctr"/>
+          <a:lstStyle>
+            <a:defPPr>
+              <a:defRPr lang="en-US"/>
+            </a:defPPr>
+            <a:lvl1pPr marL="0" algn="l" defTabSz="457200" rtl="0" eaLnBrk="1" latinLnBrk="0" hangingPunct="1">
+              <a:defRPr sz="1800" kern="1200">
+                <a:solidFill>
+                  <a:schemeClr val="lt1"/>
+                </a:solidFill>
+                <a:latin typeface="+mn-lt"/>
+                <a:ea typeface="+mn-ea"/>
+                <a:cs typeface="+mn-cs"/>
+              </a:defRPr>
+            </a:lvl1pPr>
+            <a:lvl2pPr marL="457200" algn="l" defTabSz="457200" rtl="0" eaLnBrk="1" latinLnBrk="0" hangingPunct="1">
+              <a:defRPr sz="1800" kern="1200">
+                <a:solidFill>
+                  <a:schemeClr val="lt1"/>
+                </a:solidFill>
+                <a:latin typeface="+mn-lt"/>
+                <a:ea typeface="+mn-ea"/>
+                <a:cs typeface="+mn-cs"/>
+              </a:defRPr>
+            </a:lvl2pPr>
+            <a:lvl3pPr marL="914400" algn="l" defTabSz="457200" rtl="0" eaLnBrk="1" latinLnBrk="0" hangingPunct="1">
+              <a:defRPr sz="1800" kern="1200">
+                <a:solidFill>
+                  <a:schemeClr val="lt1"/>
+                </a:solidFill>
+                <a:latin typeface="+mn-lt"/>
+                <a:ea typeface="+mn-ea"/>
+                <a:cs typeface="+mn-cs"/>
+              </a:defRPr>
+            </a:lvl3pPr>
+            <a:lvl4pPr marL="1371600" algn="l" defTabSz="457200" rtl="0" eaLnBrk="1" latinLnBrk="0" hangingPunct="1">
+              <a:defRPr sz="1800" kern="1200">
+                <a:solidFill>
+                  <a:schemeClr val="lt1"/>
+                </a:solidFill>
+                <a:latin typeface="+mn-lt"/>
+                <a:ea typeface="+mn-ea"/>
+                <a:cs typeface="+mn-cs"/>
+              </a:defRPr>
+            </a:lvl4pPr>
+            <a:lvl5pPr marL="1828800" algn="l" defTabSz="457200" rtl="0" eaLnBrk="1" latinLnBrk="0" hangingPunct="1">
+              <a:defRPr sz="1800" kern="1200">
+                <a:solidFill>
+                  <a:schemeClr val="lt1"/>
+                </a:solidFill>
+                <a:latin typeface="+mn-lt"/>
+                <a:ea typeface="+mn-ea"/>
+                <a:cs typeface="+mn-cs"/>
+              </a:defRPr>
+            </a:lvl5pPr>
+            <a:lvl6pPr marL="2286000" algn="l" defTabSz="457200" rtl="0" eaLnBrk="1" latinLnBrk="0" hangingPunct="1">
+              <a:defRPr sz="1800" kern="1200">
+                <a:solidFill>
+                  <a:schemeClr val="lt1"/>
+                </a:solidFill>
+                <a:latin typeface="+mn-lt"/>
+                <a:ea typeface="+mn-ea"/>
+                <a:cs typeface="+mn-cs"/>
+              </a:defRPr>
+            </a:lvl6pPr>
+            <a:lvl7pPr marL="2743200" algn="l" defTabSz="457200" rtl="0" eaLnBrk="1" latinLnBrk="0" hangingPunct="1">
+              <a:defRPr sz="1800" kern="1200">
+                <a:solidFill>
+                  <a:schemeClr val="lt1"/>
+                </a:solidFill>
+                <a:latin typeface="+mn-lt"/>
+                <a:ea typeface="+mn-ea"/>
+                <a:cs typeface="+mn-cs"/>
+              </a:defRPr>
+            </a:lvl7pPr>
+            <a:lvl8pPr marL="3200400" algn="l" defTabSz="457200" rtl="0" eaLnBrk="1" latinLnBrk="0" hangingPunct="1">
+              <a:defRPr sz="1800" kern="1200">
+                <a:solidFill>
+                  <a:schemeClr val="lt1"/>
+                </a:solidFill>
+                <a:latin typeface="+mn-lt"/>
+                <a:ea typeface="+mn-ea"/>
+                <a:cs typeface="+mn-cs"/>
+              </a:defRPr>
+            </a:lvl8pPr>
+            <a:lvl9pPr marL="3657600" algn="l" defTabSz="457200" rtl="0" eaLnBrk="1" latinLnBrk="0" hangingPunct="1">
+              <a:defRPr sz="1800" kern="1200">
+                <a:solidFill>
+                  <a:schemeClr val="lt1"/>
+                </a:solidFill>
+                <a:latin typeface="+mn-lt"/>
+                <a:ea typeface="+mn-ea"/>
+                <a:cs typeface="+mn-cs"/>
+              </a:defRPr>
+            </a:lvl9pPr>
+          </a:lstStyle>
+          <a:p>
+            <a:pPr algn="ctr">
+              <a:defRPr sz="1400" b="1"/>
+            </a:pPr>
+            <a:r>
+              <a:rPr dirty="0"/>
+              <a:t>Run Birthday Job</a:t>
+            </a:r>
+          </a:p>
+        </p:txBody>
+      </p:sp>
+      <p:sp>
+        <p:nvSpPr>
+          <p:cNvPr id="13" name="Rounded Rectangle 8">
+            <a:extLst>
+              <a:ext uri="{FF2B5EF4-FFF2-40B4-BE49-F238E27FC236}">
+                <a16:creationId xmlns:a16="http://schemas.microsoft.com/office/drawing/2014/main" id="{574AC724-8786-38A1-884B-158E001FA48F}"/>
+              </a:ext>
+            </a:extLst>
+          </p:cNvPr>
+          <p:cNvSpPr/>
+          <p:nvPr/>
+        </p:nvSpPr>
+        <p:spPr>
+          <a:xfrm>
+            <a:off x="6917017" y="4984457"/>
+            <a:ext cx="1828800" cy="914400"/>
+          </a:xfrm>
+          <a:prstGeom prst="roundRect">
+            <a:avLst/>
+          </a:prstGeom>
+          <a:solidFill>
+            <a:srgbClr val="D77829"/>
+          </a:solidFill>
+          <a:ln>
+            <a:solidFill>
+              <a:srgbClr val="505050"/>
+            </a:solidFill>
+          </a:ln>
+        </p:spPr>
+        <p:style>
+          <a:lnRef idx="1">
+            <a:schemeClr val="accent1"/>
+          </a:lnRef>
+          <a:fillRef idx="3">
+            <a:schemeClr val="accent1"/>
+          </a:fillRef>
+          <a:effectRef idx="2">
+            <a:schemeClr val="accent1"/>
+          </a:effectRef>
+          <a:fontRef idx="minor">
+            <a:schemeClr val="lt1"/>
+          </a:fontRef>
+        </p:style>
+        <p:txBody>
+          <a:bodyPr rtlCol="0" anchor="ctr"/>
+          <a:lstStyle>
+            <a:defPPr>
+              <a:defRPr lang="en-US"/>
+            </a:defPPr>
+            <a:lvl1pPr marL="0" algn="l" defTabSz="457200" rtl="0" eaLnBrk="1" latinLnBrk="0" hangingPunct="1">
+              <a:defRPr sz="1800" kern="1200">
+                <a:solidFill>
+                  <a:schemeClr val="lt1"/>
+                </a:solidFill>
+                <a:latin typeface="+mn-lt"/>
+                <a:ea typeface="+mn-ea"/>
+                <a:cs typeface="+mn-cs"/>
+              </a:defRPr>
+            </a:lvl1pPr>
+            <a:lvl2pPr marL="457200" algn="l" defTabSz="457200" rtl="0" eaLnBrk="1" latinLnBrk="0" hangingPunct="1">
+              <a:defRPr sz="1800" kern="1200">
+                <a:solidFill>
+                  <a:schemeClr val="lt1"/>
+                </a:solidFill>
+                <a:latin typeface="+mn-lt"/>
+                <a:ea typeface="+mn-ea"/>
+                <a:cs typeface="+mn-cs"/>
+              </a:defRPr>
+            </a:lvl2pPr>
+            <a:lvl3pPr marL="914400" algn="l" defTabSz="457200" rtl="0" eaLnBrk="1" latinLnBrk="0" hangingPunct="1">
+              <a:defRPr sz="1800" kern="1200">
+                <a:solidFill>
+                  <a:schemeClr val="lt1"/>
+                </a:solidFill>
+                <a:latin typeface="+mn-lt"/>
+                <a:ea typeface="+mn-ea"/>
+                <a:cs typeface="+mn-cs"/>
+              </a:defRPr>
+            </a:lvl3pPr>
+            <a:lvl4pPr marL="1371600" algn="l" defTabSz="457200" rtl="0" eaLnBrk="1" latinLnBrk="0" hangingPunct="1">
+              <a:defRPr sz="1800" kern="1200">
+                <a:solidFill>
+                  <a:schemeClr val="lt1"/>
+                </a:solidFill>
+                <a:latin typeface="+mn-lt"/>
+                <a:ea typeface="+mn-ea"/>
+                <a:cs typeface="+mn-cs"/>
+              </a:defRPr>
+            </a:lvl4pPr>
+            <a:lvl5pPr marL="1828800" algn="l" defTabSz="457200" rtl="0" eaLnBrk="1" latinLnBrk="0" hangingPunct="1">
+              <a:defRPr sz="1800" kern="1200">
+                <a:solidFill>
+                  <a:schemeClr val="lt1"/>
+                </a:solidFill>
+                <a:latin typeface="+mn-lt"/>
+                <a:ea typeface="+mn-ea"/>
+                <a:cs typeface="+mn-cs"/>
+              </a:defRPr>
+            </a:lvl5pPr>
+            <a:lvl6pPr marL="2286000" algn="l" defTabSz="457200" rtl="0" eaLnBrk="1" latinLnBrk="0" hangingPunct="1">
+              <a:defRPr sz="1800" kern="1200">
+                <a:solidFill>
+                  <a:schemeClr val="lt1"/>
+                </a:solidFill>
+                <a:latin typeface="+mn-lt"/>
+                <a:ea typeface="+mn-ea"/>
+                <a:cs typeface="+mn-cs"/>
+              </a:defRPr>
+            </a:lvl6pPr>
+            <a:lvl7pPr marL="2743200" algn="l" defTabSz="457200" rtl="0" eaLnBrk="1" latinLnBrk="0" hangingPunct="1">
+              <a:defRPr sz="1800" kern="1200">
+                <a:solidFill>
+                  <a:schemeClr val="lt1"/>
+                </a:solidFill>
+                <a:latin typeface="+mn-lt"/>
+                <a:ea typeface="+mn-ea"/>
+                <a:cs typeface="+mn-cs"/>
+              </a:defRPr>
+            </a:lvl7pPr>
+            <a:lvl8pPr marL="3200400" algn="l" defTabSz="457200" rtl="0" eaLnBrk="1" latinLnBrk="0" hangingPunct="1">
+              <a:defRPr sz="1800" kern="1200">
+                <a:solidFill>
+                  <a:schemeClr val="lt1"/>
+                </a:solidFill>
+                <a:latin typeface="+mn-lt"/>
+                <a:ea typeface="+mn-ea"/>
+                <a:cs typeface="+mn-cs"/>
+              </a:defRPr>
+            </a:lvl8pPr>
+            <a:lvl9pPr marL="3657600" algn="l" defTabSz="457200" rtl="0" eaLnBrk="1" latinLnBrk="0" hangingPunct="1">
+              <a:defRPr sz="1800" kern="1200">
+                <a:solidFill>
+                  <a:schemeClr val="lt1"/>
+                </a:solidFill>
+                <a:latin typeface="+mn-lt"/>
+                <a:ea typeface="+mn-ea"/>
+                <a:cs typeface="+mn-cs"/>
+              </a:defRPr>
+            </a:lvl9pPr>
+          </a:lstStyle>
+          <a:p>
+            <a:pPr algn="ctr">
+              <a:defRPr sz="1400" b="1"/>
+            </a:pPr>
+            <a:r>
+              <a:t>Admin Utilities</a:t>
+            </a:r>
+          </a:p>
+        </p:txBody>
+      </p:sp>
+      <p:sp>
+        <p:nvSpPr>
+          <p:cNvPr id="24" name="Title 1">
+            <a:extLst>
+              <a:ext uri="{FF2B5EF4-FFF2-40B4-BE49-F238E27FC236}">
+                <a16:creationId xmlns:a16="http://schemas.microsoft.com/office/drawing/2014/main" id="{7212F7A4-0832-61BC-C284-9040179DFACE}"/>
+              </a:ext>
+            </a:extLst>
+          </p:cNvPr>
+          <p:cNvSpPr txBox="1">
+            <a:spLocks/>
+          </p:cNvSpPr>
+          <p:nvPr/>
+        </p:nvSpPr>
+        <p:spPr>
+          <a:xfrm>
+            <a:off x="457200" y="274638"/>
+            <a:ext cx="8229600" cy="1143000"/>
+          </a:xfrm>
+          <a:prstGeom prst="rect">
+            <a:avLst/>
+          </a:prstGeom>
+        </p:spPr>
+        <p:txBody>
+          <a:bodyPr vert="horz" lIns="91440" tIns="45720" rIns="91440" bIns="45720" rtlCol="0" anchor="ctr">
+            <a:normAutofit/>
+          </a:bodyPr>
+          <a:lstStyle>
+            <a:lvl1pPr algn="ctr" defTabSz="457200" rtl="0" eaLnBrk="1" latinLnBrk="0" hangingPunct="1">
+              <a:spcBef>
+                <a:spcPct val="0"/>
+              </a:spcBef>
+              <a:buNone/>
+              <a:defRPr sz="4400" kern="1200">
+                <a:solidFill>
+                  <a:schemeClr val="tx1"/>
+                </a:solidFill>
+                <a:latin typeface="+mj-lt"/>
+                <a:ea typeface="+mj-ea"/>
+                <a:cs typeface="+mj-cs"/>
+              </a:defRPr>
+            </a:lvl1pPr>
+          </a:lstStyle>
+          <a:p>
+            <a:r>
+              <a:rPr lang="en-US" sz="3200" b="1" dirty="0">
+                <a:solidFill>
+                  <a:srgbClr val="007BD0"/>
+                </a:solidFill>
+              </a:rPr>
+              <a:t>Put Your Party Hats On!</a:t>
+            </a:r>
+          </a:p>
+        </p:txBody>
+      </p:sp>
+      <p:grpSp>
+        <p:nvGrpSpPr>
+          <p:cNvPr id="26" name="Group 25">
+            <a:extLst>
+              <a:ext uri="{FF2B5EF4-FFF2-40B4-BE49-F238E27FC236}">
+                <a16:creationId xmlns:a16="http://schemas.microsoft.com/office/drawing/2014/main" id="{E48F30D3-C1B4-DF96-5D50-AD2936AF0AE4}"/>
+              </a:ext>
+            </a:extLst>
+          </p:cNvPr>
+          <p:cNvGrpSpPr/>
+          <p:nvPr/>
+        </p:nvGrpSpPr>
+        <p:grpSpPr>
+          <a:xfrm>
+            <a:off x="718223" y="61328"/>
+            <a:ext cx="7707554" cy="457200"/>
+            <a:chOff x="274320" y="182880"/>
+            <a:chExt cx="7707554" cy="457200"/>
+          </a:xfrm>
+        </p:grpSpPr>
+        <p:sp>
+          <p:nvSpPr>
+            <p:cNvPr id="29" name="Isosceles Triangle 28">
+              <a:extLst>
+                <a:ext uri="{FF2B5EF4-FFF2-40B4-BE49-F238E27FC236}">
+                  <a16:creationId xmlns:a16="http://schemas.microsoft.com/office/drawing/2014/main" id="{2B3E4854-BD22-CA38-08B5-3903E50B27D4}"/>
+                </a:ext>
+              </a:extLst>
+            </p:cNvPr>
+            <p:cNvSpPr/>
+            <p:nvPr/>
+          </p:nvSpPr>
+          <p:spPr>
+            <a:xfrm rot="10800000">
+              <a:off x="274320" y="182880"/>
+              <a:ext cx="640080" cy="457200"/>
+            </a:xfrm>
+            <a:prstGeom prst="triangle">
+              <a:avLst/>
+            </a:prstGeom>
+            <a:solidFill>
+              <a:srgbClr val="FFCB05"/>
+            </a:solidFill>
+            <a:ln>
+              <a:noFill/>
+            </a:ln>
+          </p:spPr>
+          <p:style>
+            <a:lnRef idx="1">
+              <a:schemeClr val="accent1"/>
+            </a:lnRef>
+            <a:fillRef idx="3">
+              <a:schemeClr val="accent1"/>
+            </a:fillRef>
+            <a:effectRef idx="2">
+              <a:schemeClr val="accent1"/>
+            </a:effectRef>
+            <a:fontRef idx="minor">
+              <a:schemeClr val="lt1"/>
+            </a:fontRef>
+          </p:style>
+          <p:txBody>
+            <a:bodyPr rtlCol="0" anchor="ctr"/>
+            <a:lstStyle/>
+            <a:p>
+              <a:pPr algn="ctr"/>
+              <a:endParaRPr/>
+            </a:p>
+          </p:txBody>
+        </p:sp>
+        <p:sp>
+          <p:nvSpPr>
+            <p:cNvPr id="30" name="Isosceles Triangle 29">
+              <a:extLst>
+                <a:ext uri="{FF2B5EF4-FFF2-40B4-BE49-F238E27FC236}">
+                  <a16:creationId xmlns:a16="http://schemas.microsoft.com/office/drawing/2014/main" id="{AC1675C8-A29C-ACA3-1D44-2FDE827545EC}"/>
+                </a:ext>
+              </a:extLst>
+            </p:cNvPr>
+            <p:cNvSpPr/>
+            <p:nvPr/>
+          </p:nvSpPr>
+          <p:spPr>
+            <a:xfrm rot="10800000">
+              <a:off x="914400" y="182880"/>
+              <a:ext cx="640080" cy="457200"/>
+            </a:xfrm>
+            <a:prstGeom prst="triangle">
+              <a:avLst/>
+            </a:prstGeom>
+            <a:solidFill>
+              <a:srgbClr val="87CEFA"/>
+            </a:solidFill>
+            <a:ln>
+              <a:noFill/>
+            </a:ln>
+          </p:spPr>
+          <p:style>
+            <a:lnRef idx="1">
+              <a:schemeClr val="accent1"/>
+            </a:lnRef>
+            <a:fillRef idx="3">
+              <a:schemeClr val="accent1"/>
+            </a:fillRef>
+            <a:effectRef idx="2">
+              <a:schemeClr val="accent1"/>
+            </a:effectRef>
+            <a:fontRef idx="minor">
+              <a:schemeClr val="lt1"/>
+            </a:fontRef>
+          </p:style>
+          <p:txBody>
+            <a:bodyPr rtlCol="0" anchor="ctr"/>
+            <a:lstStyle/>
+            <a:p>
+              <a:pPr algn="ctr"/>
+              <a:endParaRPr dirty="0"/>
+            </a:p>
+          </p:txBody>
+        </p:sp>
+        <p:sp>
+          <p:nvSpPr>
+            <p:cNvPr id="31" name="Isosceles Triangle 30">
+              <a:extLst>
+                <a:ext uri="{FF2B5EF4-FFF2-40B4-BE49-F238E27FC236}">
+                  <a16:creationId xmlns:a16="http://schemas.microsoft.com/office/drawing/2014/main" id="{D0D78AFC-363C-7626-DDFF-1625B253997A}"/>
+                </a:ext>
+              </a:extLst>
+            </p:cNvPr>
+            <p:cNvSpPr/>
+            <p:nvPr/>
+          </p:nvSpPr>
+          <p:spPr>
+            <a:xfrm rot="10800000">
+              <a:off x="1554480" y="182880"/>
+              <a:ext cx="640080" cy="457200"/>
+            </a:xfrm>
+            <a:prstGeom prst="triangle">
+              <a:avLst/>
+            </a:prstGeom>
+            <a:solidFill>
+              <a:srgbClr val="FFB6C1"/>
+            </a:solidFill>
+            <a:ln>
+              <a:noFill/>
+            </a:ln>
+          </p:spPr>
+          <p:style>
+            <a:lnRef idx="1">
+              <a:schemeClr val="accent1"/>
+            </a:lnRef>
+            <a:fillRef idx="3">
+              <a:schemeClr val="accent1"/>
+            </a:fillRef>
+            <a:effectRef idx="2">
+              <a:schemeClr val="accent1"/>
+            </a:effectRef>
+            <a:fontRef idx="minor">
+              <a:schemeClr val="lt1"/>
+            </a:fontRef>
+          </p:style>
+          <p:txBody>
+            <a:bodyPr rtlCol="0" anchor="ctr"/>
+            <a:lstStyle/>
+            <a:p>
+              <a:pPr algn="ctr"/>
+              <a:endParaRPr/>
+            </a:p>
+          </p:txBody>
+        </p:sp>
+        <p:sp>
+          <p:nvSpPr>
+            <p:cNvPr id="32" name="Isosceles Triangle 31">
+              <a:extLst>
+                <a:ext uri="{FF2B5EF4-FFF2-40B4-BE49-F238E27FC236}">
+                  <a16:creationId xmlns:a16="http://schemas.microsoft.com/office/drawing/2014/main" id="{AC7E288B-D57F-DAFC-E8BD-D0C1E6C66E21}"/>
+                </a:ext>
+              </a:extLst>
+            </p:cNvPr>
+            <p:cNvSpPr/>
+            <p:nvPr/>
+          </p:nvSpPr>
+          <p:spPr>
+            <a:xfrm rot="10800000">
+              <a:off x="2194560" y="182880"/>
+              <a:ext cx="640080" cy="457200"/>
+            </a:xfrm>
+            <a:prstGeom prst="triangle">
+              <a:avLst/>
+            </a:prstGeom>
+            <a:solidFill>
+              <a:srgbClr val="FFCB05"/>
+            </a:solidFill>
+            <a:ln>
+              <a:noFill/>
+            </a:ln>
+          </p:spPr>
+          <p:style>
+            <a:lnRef idx="1">
+              <a:schemeClr val="accent1"/>
+            </a:lnRef>
+            <a:fillRef idx="3">
+              <a:schemeClr val="accent1"/>
+            </a:fillRef>
+            <a:effectRef idx="2">
+              <a:schemeClr val="accent1"/>
+            </a:effectRef>
+            <a:fontRef idx="minor">
+              <a:schemeClr val="lt1"/>
+            </a:fontRef>
+          </p:style>
+          <p:txBody>
+            <a:bodyPr rtlCol="0" anchor="ctr"/>
+            <a:lstStyle/>
+            <a:p>
+              <a:pPr algn="ctr"/>
+              <a:endParaRPr/>
+            </a:p>
+          </p:txBody>
+        </p:sp>
+        <p:sp>
+          <p:nvSpPr>
+            <p:cNvPr id="34" name="Isosceles Triangle 33">
+              <a:extLst>
+                <a:ext uri="{FF2B5EF4-FFF2-40B4-BE49-F238E27FC236}">
+                  <a16:creationId xmlns:a16="http://schemas.microsoft.com/office/drawing/2014/main" id="{CAACDE7F-D161-52AD-988A-B7F26D1A34DC}"/>
+                </a:ext>
+              </a:extLst>
+            </p:cNvPr>
+            <p:cNvSpPr/>
+            <p:nvPr/>
+          </p:nvSpPr>
+          <p:spPr>
+            <a:xfrm rot="10800000">
+              <a:off x="2834640" y="182880"/>
+              <a:ext cx="640080" cy="457200"/>
+            </a:xfrm>
+            <a:prstGeom prst="triangle">
+              <a:avLst/>
+            </a:prstGeom>
+            <a:solidFill>
+              <a:srgbClr val="87CEFA"/>
+            </a:solidFill>
+            <a:ln>
+              <a:noFill/>
+            </a:ln>
+          </p:spPr>
+          <p:style>
+            <a:lnRef idx="1">
+              <a:schemeClr val="accent1"/>
+            </a:lnRef>
+            <a:fillRef idx="3">
+              <a:schemeClr val="accent1"/>
+            </a:fillRef>
+            <a:effectRef idx="2">
+              <a:schemeClr val="accent1"/>
+            </a:effectRef>
+            <a:fontRef idx="minor">
+              <a:schemeClr val="lt1"/>
+            </a:fontRef>
+          </p:style>
+          <p:txBody>
+            <a:bodyPr rtlCol="0" anchor="ctr"/>
+            <a:lstStyle/>
+            <a:p>
+              <a:pPr algn="ctr"/>
+              <a:endParaRPr/>
+            </a:p>
+          </p:txBody>
+        </p:sp>
+        <p:sp>
+          <p:nvSpPr>
+            <p:cNvPr id="36" name="Isosceles Triangle 35">
+              <a:extLst>
+                <a:ext uri="{FF2B5EF4-FFF2-40B4-BE49-F238E27FC236}">
+                  <a16:creationId xmlns:a16="http://schemas.microsoft.com/office/drawing/2014/main" id="{3232A811-0B4C-94E3-5104-A62519F3814A}"/>
+                </a:ext>
+              </a:extLst>
+            </p:cNvPr>
+            <p:cNvSpPr/>
+            <p:nvPr/>
+          </p:nvSpPr>
+          <p:spPr>
+            <a:xfrm rot="10800000">
+              <a:off x="3474720" y="182880"/>
+              <a:ext cx="640080" cy="457200"/>
+            </a:xfrm>
+            <a:prstGeom prst="triangle">
+              <a:avLst/>
+            </a:prstGeom>
+            <a:solidFill>
+              <a:srgbClr val="FFB6C1"/>
+            </a:solidFill>
+            <a:ln>
+              <a:noFill/>
+            </a:ln>
+          </p:spPr>
+          <p:style>
+            <a:lnRef idx="1">
+              <a:schemeClr val="accent1"/>
+            </a:lnRef>
+            <a:fillRef idx="3">
+              <a:schemeClr val="accent1"/>
+            </a:fillRef>
+            <a:effectRef idx="2">
+              <a:schemeClr val="accent1"/>
+            </a:effectRef>
+            <a:fontRef idx="minor">
+              <a:schemeClr val="lt1"/>
+            </a:fontRef>
+          </p:style>
+          <p:txBody>
+            <a:bodyPr rtlCol="0" anchor="ctr"/>
+            <a:lstStyle/>
+            <a:p>
+              <a:pPr algn="ctr"/>
+              <a:endParaRPr/>
+            </a:p>
+          </p:txBody>
+        </p:sp>
+        <p:sp>
+          <p:nvSpPr>
+            <p:cNvPr id="37" name="Isosceles Triangle 36">
+              <a:extLst>
+                <a:ext uri="{FF2B5EF4-FFF2-40B4-BE49-F238E27FC236}">
+                  <a16:creationId xmlns:a16="http://schemas.microsoft.com/office/drawing/2014/main" id="{67E79993-D5A9-80AE-C97C-4BE7B48A4ECF}"/>
+                </a:ext>
+              </a:extLst>
+            </p:cNvPr>
+            <p:cNvSpPr/>
+            <p:nvPr/>
+          </p:nvSpPr>
+          <p:spPr>
+            <a:xfrm rot="10800000">
+              <a:off x="4141394" y="182880"/>
+              <a:ext cx="640080" cy="457200"/>
+            </a:xfrm>
+            <a:prstGeom prst="triangle">
+              <a:avLst/>
+            </a:prstGeom>
+            <a:solidFill>
+              <a:srgbClr val="FFCB05"/>
+            </a:solidFill>
+            <a:ln>
+              <a:noFill/>
+            </a:ln>
+          </p:spPr>
+          <p:style>
+            <a:lnRef idx="1">
+              <a:schemeClr val="accent1"/>
+            </a:lnRef>
+            <a:fillRef idx="3">
+              <a:schemeClr val="accent1"/>
+            </a:fillRef>
+            <a:effectRef idx="2">
+              <a:schemeClr val="accent1"/>
+            </a:effectRef>
+            <a:fontRef idx="minor">
+              <a:schemeClr val="lt1"/>
+            </a:fontRef>
+          </p:style>
+          <p:txBody>
+            <a:bodyPr rtlCol="0" anchor="ctr"/>
+            <a:lstStyle/>
+            <a:p>
+              <a:pPr algn="ctr"/>
+              <a:endParaRPr/>
+            </a:p>
+          </p:txBody>
+        </p:sp>
+        <p:sp>
+          <p:nvSpPr>
+            <p:cNvPr id="38" name="Isosceles Triangle 37">
+              <a:extLst>
+                <a:ext uri="{FF2B5EF4-FFF2-40B4-BE49-F238E27FC236}">
+                  <a16:creationId xmlns:a16="http://schemas.microsoft.com/office/drawing/2014/main" id="{03927899-AF7D-6FB1-D273-8B79635C8943}"/>
+                </a:ext>
+              </a:extLst>
+            </p:cNvPr>
+            <p:cNvSpPr/>
+            <p:nvPr/>
+          </p:nvSpPr>
+          <p:spPr>
+            <a:xfrm rot="10800000">
+              <a:off x="4781474" y="182880"/>
+              <a:ext cx="640080" cy="457200"/>
+            </a:xfrm>
+            <a:prstGeom prst="triangle">
+              <a:avLst/>
+            </a:prstGeom>
+            <a:solidFill>
+              <a:srgbClr val="87CEFA"/>
+            </a:solidFill>
+            <a:ln>
+              <a:noFill/>
+            </a:ln>
+          </p:spPr>
+          <p:style>
+            <a:lnRef idx="1">
+              <a:schemeClr val="accent1"/>
+            </a:lnRef>
+            <a:fillRef idx="3">
+              <a:schemeClr val="accent1"/>
+            </a:fillRef>
+            <a:effectRef idx="2">
+              <a:schemeClr val="accent1"/>
+            </a:effectRef>
+            <a:fontRef idx="minor">
+              <a:schemeClr val="lt1"/>
+            </a:fontRef>
+          </p:style>
+          <p:txBody>
+            <a:bodyPr rtlCol="0" anchor="ctr"/>
+            <a:lstStyle/>
+            <a:p>
+              <a:pPr algn="ctr"/>
+              <a:endParaRPr/>
+            </a:p>
+          </p:txBody>
+        </p:sp>
+        <p:sp>
+          <p:nvSpPr>
+            <p:cNvPr id="39" name="Isosceles Triangle 38">
+              <a:extLst>
+                <a:ext uri="{FF2B5EF4-FFF2-40B4-BE49-F238E27FC236}">
+                  <a16:creationId xmlns:a16="http://schemas.microsoft.com/office/drawing/2014/main" id="{5A72B3A2-4043-D213-85D0-B82BEAD72376}"/>
+                </a:ext>
+              </a:extLst>
+            </p:cNvPr>
+            <p:cNvSpPr/>
+            <p:nvPr/>
+          </p:nvSpPr>
+          <p:spPr>
+            <a:xfrm rot="10800000">
+              <a:off x="5421554" y="182880"/>
+              <a:ext cx="640080" cy="457200"/>
+            </a:xfrm>
+            <a:prstGeom prst="triangle">
+              <a:avLst/>
+            </a:prstGeom>
+            <a:solidFill>
+              <a:srgbClr val="FFB6C1"/>
+            </a:solidFill>
+            <a:ln>
+              <a:noFill/>
+            </a:ln>
+          </p:spPr>
+          <p:style>
+            <a:lnRef idx="1">
+              <a:schemeClr val="accent1"/>
+            </a:lnRef>
+            <a:fillRef idx="3">
+              <a:schemeClr val="accent1"/>
+            </a:fillRef>
+            <a:effectRef idx="2">
+              <a:schemeClr val="accent1"/>
+            </a:effectRef>
+            <a:fontRef idx="minor">
+              <a:schemeClr val="lt1"/>
+            </a:fontRef>
+          </p:style>
+          <p:txBody>
+            <a:bodyPr rtlCol="0" anchor="ctr"/>
+            <a:lstStyle/>
+            <a:p>
+              <a:pPr algn="ctr"/>
+              <a:endParaRPr/>
+            </a:p>
+          </p:txBody>
+        </p:sp>
+        <p:sp>
+          <p:nvSpPr>
+            <p:cNvPr id="40" name="Isosceles Triangle 39">
+              <a:extLst>
+                <a:ext uri="{FF2B5EF4-FFF2-40B4-BE49-F238E27FC236}">
+                  <a16:creationId xmlns:a16="http://schemas.microsoft.com/office/drawing/2014/main" id="{0E4A0F8F-BCF4-7DAC-BA2B-55D835715906}"/>
+                </a:ext>
+              </a:extLst>
+            </p:cNvPr>
+            <p:cNvSpPr/>
+            <p:nvPr/>
+          </p:nvSpPr>
+          <p:spPr>
+            <a:xfrm rot="10800000">
+              <a:off x="6061634" y="182880"/>
+              <a:ext cx="640080" cy="457200"/>
+            </a:xfrm>
+            <a:prstGeom prst="triangle">
+              <a:avLst/>
+            </a:prstGeom>
+            <a:solidFill>
+              <a:srgbClr val="FFCB05"/>
+            </a:solidFill>
+            <a:ln>
+              <a:noFill/>
+            </a:ln>
+          </p:spPr>
+          <p:style>
+            <a:lnRef idx="1">
+              <a:schemeClr val="accent1"/>
+            </a:lnRef>
+            <a:fillRef idx="3">
+              <a:schemeClr val="accent1"/>
+            </a:fillRef>
+            <a:effectRef idx="2">
+              <a:schemeClr val="accent1"/>
+            </a:effectRef>
+            <a:fontRef idx="minor">
+              <a:schemeClr val="lt1"/>
+            </a:fontRef>
+          </p:style>
+          <p:txBody>
+            <a:bodyPr rtlCol="0" anchor="ctr"/>
+            <a:lstStyle/>
+            <a:p>
+              <a:pPr algn="ctr"/>
+              <a:endParaRPr/>
+            </a:p>
+          </p:txBody>
+        </p:sp>
+        <p:sp>
+          <p:nvSpPr>
+            <p:cNvPr id="41" name="Isosceles Triangle 40">
+              <a:extLst>
+                <a:ext uri="{FF2B5EF4-FFF2-40B4-BE49-F238E27FC236}">
+                  <a16:creationId xmlns:a16="http://schemas.microsoft.com/office/drawing/2014/main" id="{1EA6C1AB-F99D-4334-666E-C24A9D0B3786}"/>
+                </a:ext>
+              </a:extLst>
+            </p:cNvPr>
+            <p:cNvSpPr/>
+            <p:nvPr/>
+          </p:nvSpPr>
+          <p:spPr>
+            <a:xfrm rot="10800000">
+              <a:off x="6701714" y="182880"/>
+              <a:ext cx="640080" cy="457200"/>
+            </a:xfrm>
+            <a:prstGeom prst="triangle">
+              <a:avLst/>
+            </a:prstGeom>
+            <a:solidFill>
+              <a:srgbClr val="87CEFA"/>
+            </a:solidFill>
+            <a:ln>
+              <a:noFill/>
+            </a:ln>
+          </p:spPr>
+          <p:style>
+            <a:lnRef idx="1">
+              <a:schemeClr val="accent1"/>
+            </a:lnRef>
+            <a:fillRef idx="3">
+              <a:schemeClr val="accent1"/>
+            </a:fillRef>
+            <a:effectRef idx="2">
+              <a:schemeClr val="accent1"/>
+            </a:effectRef>
+            <a:fontRef idx="minor">
+              <a:schemeClr val="lt1"/>
+            </a:fontRef>
+          </p:style>
+          <p:txBody>
+            <a:bodyPr rtlCol="0" anchor="ctr"/>
+            <a:lstStyle/>
+            <a:p>
+              <a:pPr algn="ctr"/>
+              <a:endParaRPr/>
+            </a:p>
+          </p:txBody>
+        </p:sp>
+        <p:sp>
+          <p:nvSpPr>
+            <p:cNvPr id="42" name="Isosceles Triangle 41">
+              <a:extLst>
+                <a:ext uri="{FF2B5EF4-FFF2-40B4-BE49-F238E27FC236}">
+                  <a16:creationId xmlns:a16="http://schemas.microsoft.com/office/drawing/2014/main" id="{2979DAA8-360D-ED8C-8E7B-01ECD5BE3A90}"/>
+                </a:ext>
+              </a:extLst>
+            </p:cNvPr>
+            <p:cNvSpPr/>
+            <p:nvPr/>
+          </p:nvSpPr>
+          <p:spPr>
+            <a:xfrm rot="10800000">
+              <a:off x="7341794" y="182880"/>
+              <a:ext cx="640080" cy="457200"/>
+            </a:xfrm>
+            <a:prstGeom prst="triangle">
+              <a:avLst/>
+            </a:prstGeom>
+            <a:solidFill>
+              <a:srgbClr val="FFB6C1"/>
+            </a:solidFill>
+            <a:ln>
+              <a:noFill/>
+            </a:ln>
+          </p:spPr>
+          <p:style>
+            <a:lnRef idx="1">
+              <a:schemeClr val="accent1"/>
+            </a:lnRef>
+            <a:fillRef idx="3">
+              <a:schemeClr val="accent1"/>
+            </a:fillRef>
+            <a:effectRef idx="2">
+              <a:schemeClr val="accent1"/>
+            </a:effectRef>
+            <a:fontRef idx="minor">
+              <a:schemeClr val="lt1"/>
+            </a:fontRef>
+          </p:style>
+          <p:txBody>
+            <a:bodyPr rtlCol="0" anchor="ctr"/>
+            <a:lstStyle/>
+            <a:p>
+              <a:pPr algn="ctr"/>
+              <a:endParaRPr/>
+            </a:p>
+          </p:txBody>
+        </p:sp>
+      </p:grpSp>
+      <p:sp>
+        <p:nvSpPr>
+          <p:cNvPr id="43" name="Arrow: Bent 42">
+            <a:extLst>
+              <a:ext uri="{FF2B5EF4-FFF2-40B4-BE49-F238E27FC236}">
+                <a16:creationId xmlns:a16="http://schemas.microsoft.com/office/drawing/2014/main" id="{02E22723-F8A8-278E-C20A-787D6F63F646}"/>
+              </a:ext>
+            </a:extLst>
+          </p:cNvPr>
+          <p:cNvSpPr/>
+          <p:nvPr/>
+        </p:nvSpPr>
+        <p:spPr>
+          <a:xfrm flipV="1">
+            <a:off x="1275689" y="2487526"/>
+            <a:ext cx="1201084" cy="772905"/>
+          </a:xfrm>
+          <a:prstGeom prst="bentArrow">
+            <a:avLst>
+              <a:gd name="adj1" fmla="val 19123"/>
+              <a:gd name="adj2" fmla="val 20808"/>
+              <a:gd name="adj3" fmla="val 25000"/>
+              <a:gd name="adj4" fmla="val 43750"/>
+            </a:avLst>
+          </a:prstGeom>
+          <a:solidFill>
+            <a:srgbClr val="007BD0"/>
+          </a:solidFill>
+        </p:spPr>
+        <p:style>
+          <a:lnRef idx="1">
+            <a:schemeClr val="accent1"/>
+          </a:lnRef>
+          <a:fillRef idx="3">
+            <a:schemeClr val="accent1"/>
+          </a:fillRef>
+          <a:effectRef idx="2">
+            <a:schemeClr val="accent1"/>
+          </a:effectRef>
+          <a:fontRef idx="minor">
+            <a:schemeClr val="lt1"/>
+          </a:fontRef>
+        </p:style>
+        <p:txBody>
+          <a:bodyPr rtlCol="0" anchor="ctr"/>
+          <a:lstStyle/>
+          <a:p>
+            <a:pPr algn="ctr"/>
+            <a:endParaRPr lang="en-US">
+              <a:solidFill>
+                <a:schemeClr val="tx1"/>
+              </a:solidFill>
+            </a:endParaRPr>
+          </a:p>
+        </p:txBody>
+      </p:sp>
+      <p:sp>
+        <p:nvSpPr>
+          <p:cNvPr id="46" name="Arrow: Bent 45">
+            <a:extLst>
+              <a:ext uri="{FF2B5EF4-FFF2-40B4-BE49-F238E27FC236}">
+                <a16:creationId xmlns:a16="http://schemas.microsoft.com/office/drawing/2014/main" id="{8E6359E1-EAFC-9F69-F34A-22C2CEAE3C12}"/>
+              </a:ext>
+            </a:extLst>
+          </p:cNvPr>
+          <p:cNvSpPr/>
+          <p:nvPr/>
+        </p:nvSpPr>
+        <p:spPr>
+          <a:xfrm rot="16200000" flipH="1" flipV="1">
+            <a:off x="4880819" y="2816270"/>
+            <a:ext cx="777240" cy="1197864"/>
+          </a:xfrm>
+          <a:prstGeom prst="bentArrow">
+            <a:avLst>
+              <a:gd name="adj1" fmla="val 19123"/>
+              <a:gd name="adj2" fmla="val 20808"/>
+              <a:gd name="adj3" fmla="val 25000"/>
+              <a:gd name="adj4" fmla="val 43750"/>
+            </a:avLst>
+          </a:prstGeom>
+          <a:solidFill>
+            <a:srgbClr val="007BD0"/>
+          </a:solidFill>
+        </p:spPr>
+        <p:style>
+          <a:lnRef idx="1">
+            <a:schemeClr val="accent1"/>
+          </a:lnRef>
+          <a:fillRef idx="3">
+            <a:schemeClr val="accent1"/>
+          </a:fillRef>
+          <a:effectRef idx="2">
+            <a:schemeClr val="accent1"/>
+          </a:effectRef>
+          <a:fontRef idx="minor">
+            <a:schemeClr val="lt1"/>
+          </a:fontRef>
+        </p:style>
+        <p:txBody>
+          <a:bodyPr rtlCol="0" anchor="ctr"/>
+          <a:lstStyle/>
+          <a:p>
+            <a:pPr algn="ctr"/>
+            <a:endParaRPr lang="en-US">
+              <a:solidFill>
+                <a:schemeClr val="tx1"/>
+              </a:solidFill>
+            </a:endParaRPr>
+          </a:p>
+        </p:txBody>
+      </p:sp>
+      <p:sp>
+        <p:nvSpPr>
+          <p:cNvPr id="47" name="Arrow: Bent 46">
+            <a:extLst>
+              <a:ext uri="{FF2B5EF4-FFF2-40B4-BE49-F238E27FC236}">
+                <a16:creationId xmlns:a16="http://schemas.microsoft.com/office/drawing/2014/main" id="{5C10AA39-07DE-2979-5CB6-2D3CBEC747F7}"/>
+              </a:ext>
+            </a:extLst>
+          </p:cNvPr>
+          <p:cNvSpPr/>
+          <p:nvPr/>
+        </p:nvSpPr>
+        <p:spPr>
+          <a:xfrm flipV="1">
+            <a:off x="5662925" y="4917323"/>
+            <a:ext cx="1201084" cy="772905"/>
+          </a:xfrm>
+          <a:prstGeom prst="bentArrow">
+            <a:avLst>
+              <a:gd name="adj1" fmla="val 19123"/>
+              <a:gd name="adj2" fmla="val 20808"/>
+              <a:gd name="adj3" fmla="val 25000"/>
+              <a:gd name="adj4" fmla="val 43750"/>
+            </a:avLst>
+          </a:prstGeom>
+          <a:solidFill>
+            <a:srgbClr val="007BD0"/>
+          </a:solidFill>
+        </p:spPr>
+        <p:style>
+          <a:lnRef idx="1">
+            <a:schemeClr val="accent1"/>
+          </a:lnRef>
+          <a:fillRef idx="3">
+            <a:schemeClr val="accent1"/>
+          </a:fillRef>
+          <a:effectRef idx="2">
+            <a:schemeClr val="accent1"/>
+          </a:effectRef>
+          <a:fontRef idx="minor">
+            <a:schemeClr val="lt1"/>
+          </a:fontRef>
+        </p:style>
+        <p:txBody>
+          <a:bodyPr rtlCol="0" anchor="ctr"/>
+          <a:lstStyle/>
+          <a:p>
+            <a:pPr algn="ctr"/>
+            <a:endParaRPr lang="en-US">
+              <a:solidFill>
+                <a:schemeClr val="tx1"/>
+              </a:solidFill>
+            </a:endParaRPr>
+          </a:p>
+        </p:txBody>
+      </p:sp>
+      <p:pic>
+        <p:nvPicPr>
+          <p:cNvPr id="48" name="Picture 47" descr="logo.png">
+            <a:extLst>
+              <a:ext uri="{FF2B5EF4-FFF2-40B4-BE49-F238E27FC236}">
+                <a16:creationId xmlns:a16="http://schemas.microsoft.com/office/drawing/2014/main" id="{458DA4EE-3CA6-83EC-A2E4-EBECF47C7ED0}"/>
+              </a:ext>
+            </a:extLst>
+          </p:cNvPr>
+          <p:cNvPicPr>
+            <a:picLocks noChangeAspect="1"/>
+          </p:cNvPicPr>
+          <p:nvPr/>
+        </p:nvPicPr>
+        <p:blipFill>
+          <a:blip r:embed="rId2"/>
+          <a:stretch>
+            <a:fillRect/>
+          </a:stretch>
+        </p:blipFill>
+        <p:spPr>
+          <a:xfrm>
+            <a:off x="83416" y="72390"/>
+            <a:ext cx="640080" cy="640080"/>
+          </a:xfrm>
+          <a:prstGeom prst="rect">
+            <a:avLst/>
+          </a:prstGeom>
+        </p:spPr>
+      </p:pic>
+      <p:pic>
+        <p:nvPicPr>
+          <p:cNvPr id="49" name="Picture 48" descr="logo.png">
+            <a:extLst>
+              <a:ext uri="{FF2B5EF4-FFF2-40B4-BE49-F238E27FC236}">
+                <a16:creationId xmlns:a16="http://schemas.microsoft.com/office/drawing/2014/main" id="{00BC9270-0B03-3415-0717-6FC1CAB28CF7}"/>
+              </a:ext>
+            </a:extLst>
+          </p:cNvPr>
+          <p:cNvPicPr>
+            <a:picLocks noChangeAspect="1"/>
+          </p:cNvPicPr>
+          <p:nvPr/>
+        </p:nvPicPr>
+        <p:blipFill>
+          <a:blip r:embed="rId2"/>
+          <a:stretch>
+            <a:fillRect/>
+          </a:stretch>
+        </p:blipFill>
+        <p:spPr>
+          <a:xfrm>
+            <a:off x="8425777" y="61327"/>
+            <a:ext cx="640080" cy="640080"/>
+          </a:xfrm>
+          <a:prstGeom prst="rect">
+            <a:avLst/>
+          </a:prstGeom>
+        </p:spPr>
+      </p:pic>
+    </p:spTree>
+    <p:extLst>
+      <p:ext uri="{BB962C8B-B14F-4D97-AF65-F5344CB8AC3E}">
+        <p14:creationId xmlns:p14="http://schemas.microsoft.com/office/powerpoint/2010/main" val="2343764289"/>
+      </p:ext>
+    </p:extLst>
   </p:cSld>
   <p:clrMapOvr>
     <a:masterClrMapping/>

</xml_diff>